<commit_message>
update through Lecture 33
</commit_message>
<xml_diff>
--- a/Lecture_Slides/PH 123 Lecture 34.pptx
+++ b/Lecture_Slides/PH 123 Lecture 34.pptx
@@ -5,18 +5,20 @@
     <p:sldMasterId id="2147483648" r:id="rId1"/>
   </p:sldMasterIdLst>
   <p:sldIdLst>
-    <p:sldId id="256" r:id="rId2"/>
-    <p:sldId id="258" r:id="rId3"/>
-    <p:sldId id="261" r:id="rId4"/>
-    <p:sldId id="266" r:id="rId5"/>
-    <p:sldId id="263" r:id="rId6"/>
-    <p:sldId id="269" r:id="rId7"/>
-    <p:sldId id="262" r:id="rId8"/>
-    <p:sldId id="260" r:id="rId9"/>
-    <p:sldId id="259" r:id="rId10"/>
-    <p:sldId id="265" r:id="rId11"/>
-    <p:sldId id="267" r:id="rId12"/>
-    <p:sldId id="270" r:id="rId13"/>
+    <p:sldId id="271" r:id="rId2"/>
+    <p:sldId id="272" r:id="rId3"/>
+    <p:sldId id="256" r:id="rId4"/>
+    <p:sldId id="258" r:id="rId5"/>
+    <p:sldId id="261" r:id="rId6"/>
+    <p:sldId id="266" r:id="rId7"/>
+    <p:sldId id="263" r:id="rId8"/>
+    <p:sldId id="269" r:id="rId9"/>
+    <p:sldId id="262" r:id="rId10"/>
+    <p:sldId id="260" r:id="rId11"/>
+    <p:sldId id="259" r:id="rId12"/>
+    <p:sldId id="265" r:id="rId13"/>
+    <p:sldId id="267" r:id="rId14"/>
+    <p:sldId id="270" r:id="rId15"/>
   </p:sldIdLst>
   <p:sldSz cx="9144000" cy="6858000" type="screen4x3"/>
   <p:notesSz cx="6858000" cy="9144000"/>
@@ -134,16 +136,71 @@
 </p:presentation>
 </file>
 
-<file path=ppt/revisionInfo.xml><?xml version="1.0" encoding="utf-8"?>
-<p1510:revInfo xmlns:a="http://schemas.openxmlformats.org/drawingml/2006/main" xmlns:r="http://schemas.openxmlformats.org/officeDocument/2006/relationships" xmlns:p1510="http://schemas.microsoft.com/office/powerpoint/2015/10/main">
-  <p1510:revLst>
-    <p1510:client id="{A372036F-6BD7-49B2-BBC0-C87BEFF32C6A}" v="3" dt="2025-05-28T22:25:59.922"/>
-  </p1510:revLst>
-</p1510:revInfo>
-</file>
-
 <file path=ppt/changesInfos/changesInfo1.xml><?xml version="1.0" encoding="utf-8"?>
 <pc:chgInfo xmlns:a="http://schemas.openxmlformats.org/drawingml/2006/main" xmlns:r="http://schemas.openxmlformats.org/officeDocument/2006/relationships" xmlns:ac="http://schemas.microsoft.com/office/drawing/2013/main/command" xmlns:pc="http://schemas.microsoft.com/office/powerpoint/2013/main/command">
+  <pc:docChgLst>
+    <pc:chgData name="Lines, Todd" userId="afaf7c3a-e8aa-4568-882a-02ad8f9e19b0" providerId="ADAL" clId="{EB4EA074-9182-46B1-B159-B90F3618D25B}"/>
+    <pc:docChg chg="custSel addSld modSld">
+      <pc:chgData name="Lines, Todd" userId="afaf7c3a-e8aa-4568-882a-02ad8f9e19b0" providerId="ADAL" clId="{EB4EA074-9182-46B1-B159-B90F3618D25B}" dt="2025-07-03T17:37:01.762" v="15" actId="20577"/>
+      <pc:docMkLst>
+        <pc:docMk/>
+      </pc:docMkLst>
+      <pc:sldChg chg="modSp new mod">
+        <pc:chgData name="Lines, Todd" userId="afaf7c3a-e8aa-4568-882a-02ad8f9e19b0" providerId="ADAL" clId="{EB4EA074-9182-46B1-B159-B90F3618D25B}" dt="2025-07-03T17:36:53.649" v="10" actId="20577"/>
+        <pc:sldMkLst>
+          <pc:docMk/>
+          <pc:sldMk cId="1011100621" sldId="271"/>
+        </pc:sldMkLst>
+        <pc:spChg chg="mod">
+          <ac:chgData name="Lines, Todd" userId="afaf7c3a-e8aa-4568-882a-02ad8f9e19b0" providerId="ADAL" clId="{EB4EA074-9182-46B1-B159-B90F3618D25B}" dt="2025-07-03T17:36:53.649" v="10" actId="20577"/>
+          <ac:spMkLst>
+            <pc:docMk/>
+            <pc:sldMk cId="1011100621" sldId="271"/>
+            <ac:spMk id="2" creationId="{3C570BC0-43B9-0493-1280-F357497B6FD2}"/>
+          </ac:spMkLst>
+        </pc:spChg>
+      </pc:sldChg>
+      <pc:sldChg chg="addSp delSp modSp new mod modClrScheme chgLayout">
+        <pc:chgData name="Lines, Todd" userId="afaf7c3a-e8aa-4568-882a-02ad8f9e19b0" providerId="ADAL" clId="{EB4EA074-9182-46B1-B159-B90F3618D25B}" dt="2025-07-03T17:37:01.762" v="15" actId="20577"/>
+        <pc:sldMkLst>
+          <pc:docMk/>
+          <pc:sldMk cId="684432333" sldId="272"/>
+        </pc:sldMkLst>
+        <pc:spChg chg="del mod ord">
+          <ac:chgData name="Lines, Todd" userId="afaf7c3a-e8aa-4568-882a-02ad8f9e19b0" providerId="ADAL" clId="{EB4EA074-9182-46B1-B159-B90F3618D25B}" dt="2025-07-03T17:36:59.879" v="12" actId="700"/>
+          <ac:spMkLst>
+            <pc:docMk/>
+            <pc:sldMk cId="684432333" sldId="272"/>
+            <ac:spMk id="2" creationId="{812C50CA-FF04-55CF-805C-E08D146CC100}"/>
+          </ac:spMkLst>
+        </pc:spChg>
+        <pc:spChg chg="del mod ord">
+          <ac:chgData name="Lines, Todd" userId="afaf7c3a-e8aa-4568-882a-02ad8f9e19b0" providerId="ADAL" clId="{EB4EA074-9182-46B1-B159-B90F3618D25B}" dt="2025-07-03T17:36:59.879" v="12" actId="700"/>
+          <ac:spMkLst>
+            <pc:docMk/>
+            <pc:sldMk cId="684432333" sldId="272"/>
+            <ac:spMk id="3" creationId="{4069CEEB-8E5C-E725-F121-BE292B3B8E05}"/>
+          </ac:spMkLst>
+        </pc:spChg>
+        <pc:spChg chg="add mod ord">
+          <ac:chgData name="Lines, Todd" userId="afaf7c3a-e8aa-4568-882a-02ad8f9e19b0" providerId="ADAL" clId="{EB4EA074-9182-46B1-B159-B90F3618D25B}" dt="2025-07-03T17:37:01.762" v="15" actId="20577"/>
+          <ac:spMkLst>
+            <pc:docMk/>
+            <pc:sldMk cId="684432333" sldId="272"/>
+            <ac:spMk id="4" creationId="{57EFC4A7-431A-16C7-9639-284FFE935132}"/>
+          </ac:spMkLst>
+        </pc:spChg>
+        <pc:spChg chg="add mod ord">
+          <ac:chgData name="Lines, Todd" userId="afaf7c3a-e8aa-4568-882a-02ad8f9e19b0" providerId="ADAL" clId="{EB4EA074-9182-46B1-B159-B90F3618D25B}" dt="2025-07-03T17:36:59.879" v="12" actId="700"/>
+          <ac:spMkLst>
+            <pc:docMk/>
+            <pc:sldMk cId="684432333" sldId="272"/>
+            <ac:spMk id="5" creationId="{E295DEED-18B7-D6FE-E17D-CE0E06A11EA7}"/>
+          </ac:spMkLst>
+        </pc:spChg>
+      </pc:sldChg>
+    </pc:docChg>
+  </pc:docChgLst>
   <pc:docChgLst>
     <pc:chgData name="Lines, Todd" userId="afaf7c3a-e8aa-4568-882a-02ad8f9e19b0" providerId="ADAL" clId="{A372036F-6BD7-49B2-BBC0-C87BEFF32C6A}"/>
     <pc:docChg chg="custSel modSld">
@@ -157,14 +214,6 @@
           <pc:docMk/>
           <pc:sldMk cId="0" sldId="261"/>
         </pc:sldMkLst>
-        <pc:picChg chg="del mod">
-          <ac:chgData name="Lines, Todd" userId="afaf7c3a-e8aa-4568-882a-02ad8f9e19b0" providerId="ADAL" clId="{A372036F-6BD7-49B2-BBC0-C87BEFF32C6A}" dt="2025-05-28T22:24:42.060" v="1" actId="21"/>
-          <ac:picMkLst>
-            <pc:docMk/>
-            <pc:sldMk cId="0" sldId="261"/>
-            <ac:picMk id="2" creationId="{03BE7C3E-5DE0-6C41-37C6-142C045551D8}"/>
-          </ac:picMkLst>
-        </pc:picChg>
       </pc:sldChg>
       <pc:sldChg chg="delSp modSp mod">
         <pc:chgData name="Lines, Todd" userId="afaf7c3a-e8aa-4568-882a-02ad8f9e19b0" providerId="ADAL" clId="{A372036F-6BD7-49B2-BBC0-C87BEFF32C6A}" dt="2025-05-28T22:26:07.536" v="7" actId="21"/>
@@ -172,22 +221,6 @@
           <pc:docMk/>
           <pc:sldMk cId="0" sldId="263"/>
         </pc:sldMkLst>
-        <pc:picChg chg="del mod">
-          <ac:chgData name="Lines, Todd" userId="afaf7c3a-e8aa-4568-882a-02ad8f9e19b0" providerId="ADAL" clId="{A372036F-6BD7-49B2-BBC0-C87BEFF32C6A}" dt="2025-05-28T22:25:21.288" v="3" actId="21"/>
-          <ac:picMkLst>
-            <pc:docMk/>
-            <pc:sldMk cId="0" sldId="263"/>
-            <ac:picMk id="2" creationId="{35E53C73-3C3C-8325-7FDD-1DB503468901}"/>
-          </ac:picMkLst>
-        </pc:picChg>
-        <pc:picChg chg="del mod">
-          <ac:chgData name="Lines, Todd" userId="afaf7c3a-e8aa-4568-882a-02ad8f9e19b0" providerId="ADAL" clId="{A372036F-6BD7-49B2-BBC0-C87BEFF32C6A}" dt="2025-05-28T22:26:07.536" v="7" actId="21"/>
-          <ac:picMkLst>
-            <pc:docMk/>
-            <pc:sldMk cId="0" sldId="263"/>
-            <ac:picMk id="3" creationId="{9925E6A0-7A63-D73A-C554-BBCBD8398B8E}"/>
-          </ac:picMkLst>
-        </pc:picChg>
         <pc:picChg chg="mod modCrop">
           <ac:chgData name="Lines, Todd" userId="afaf7c3a-e8aa-4568-882a-02ad8f9e19b0" providerId="ADAL" clId="{A372036F-6BD7-49B2-BBC0-C87BEFF32C6A}" dt="2025-05-28T22:25:49.589" v="5" actId="732"/>
           <ac:picMkLst>
@@ -382,7 +415,7 @@
             <a:fld id="{84F61AEA-5DA7-4883-91E9-49E96185C8F3}" type="datetimeFigureOut">
               <a:rPr lang="en-US" smtClean="0"/>
               <a:pPr/>
-              <a:t>5/28/2025</a:t>
+              <a:t>7/3/2025</a:t>
             </a:fld>
             <a:endParaRPr lang="en-US"/>
           </a:p>
@@ -547,7 +580,7 @@
             <a:fld id="{84F61AEA-5DA7-4883-91E9-49E96185C8F3}" type="datetimeFigureOut">
               <a:rPr lang="en-US" smtClean="0"/>
               <a:pPr/>
-              <a:t>5/28/2025</a:t>
+              <a:t>7/3/2025</a:t>
             </a:fld>
             <a:endParaRPr lang="en-US"/>
           </a:p>
@@ -722,7 +755,7 @@
             <a:fld id="{84F61AEA-5DA7-4883-91E9-49E96185C8F3}" type="datetimeFigureOut">
               <a:rPr lang="en-US" smtClean="0"/>
               <a:pPr/>
-              <a:t>5/28/2025</a:t>
+              <a:t>7/3/2025</a:t>
             </a:fld>
             <a:endParaRPr lang="en-US"/>
           </a:p>
@@ -887,7 +920,7 @@
             <a:fld id="{84F61AEA-5DA7-4883-91E9-49E96185C8F3}" type="datetimeFigureOut">
               <a:rPr lang="en-US" smtClean="0"/>
               <a:pPr/>
-              <a:t>5/28/2025</a:t>
+              <a:t>7/3/2025</a:t>
             </a:fld>
             <a:endParaRPr lang="en-US"/>
           </a:p>
@@ -1129,7 +1162,7 @@
             <a:fld id="{84F61AEA-5DA7-4883-91E9-49E96185C8F3}" type="datetimeFigureOut">
               <a:rPr lang="en-US" smtClean="0"/>
               <a:pPr/>
-              <a:t>5/28/2025</a:t>
+              <a:t>7/3/2025</a:t>
             </a:fld>
             <a:endParaRPr lang="en-US"/>
           </a:p>
@@ -1411,7 +1444,7 @@
             <a:fld id="{84F61AEA-5DA7-4883-91E9-49E96185C8F3}" type="datetimeFigureOut">
               <a:rPr lang="en-US" smtClean="0"/>
               <a:pPr/>
-              <a:t>5/28/2025</a:t>
+              <a:t>7/3/2025</a:t>
             </a:fld>
             <a:endParaRPr lang="en-US"/>
           </a:p>
@@ -1827,7 +1860,7 @@
             <a:fld id="{84F61AEA-5DA7-4883-91E9-49E96185C8F3}" type="datetimeFigureOut">
               <a:rPr lang="en-US" smtClean="0"/>
               <a:pPr/>
-              <a:t>5/28/2025</a:t>
+              <a:t>7/3/2025</a:t>
             </a:fld>
             <a:endParaRPr lang="en-US"/>
           </a:p>
@@ -1941,7 +1974,7 @@
             <a:fld id="{84F61AEA-5DA7-4883-91E9-49E96185C8F3}" type="datetimeFigureOut">
               <a:rPr lang="en-US" smtClean="0"/>
               <a:pPr/>
-              <a:t>5/28/2025</a:t>
+              <a:t>7/3/2025</a:t>
             </a:fld>
             <a:endParaRPr lang="en-US"/>
           </a:p>
@@ -2033,7 +2066,7 @@
             <a:fld id="{84F61AEA-5DA7-4883-91E9-49E96185C8F3}" type="datetimeFigureOut">
               <a:rPr lang="en-US" smtClean="0"/>
               <a:pPr/>
-              <a:t>5/28/2025</a:t>
+              <a:t>7/3/2025</a:t>
             </a:fld>
             <a:endParaRPr lang="en-US"/>
           </a:p>
@@ -2305,7 +2338,7 @@
             <a:fld id="{84F61AEA-5DA7-4883-91E9-49E96185C8F3}" type="datetimeFigureOut">
               <a:rPr lang="en-US" smtClean="0"/>
               <a:pPr/>
-              <a:t>5/28/2025</a:t>
+              <a:t>7/3/2025</a:t>
             </a:fld>
             <a:endParaRPr lang="en-US"/>
           </a:p>
@@ -2554,7 +2587,7 @@
             <a:fld id="{84F61AEA-5DA7-4883-91E9-49E96185C8F3}" type="datetimeFigureOut">
               <a:rPr lang="en-US" smtClean="0"/>
               <a:pPr/>
-              <a:t>5/28/2025</a:t>
+              <a:t>7/3/2025</a:t>
             </a:fld>
             <a:endParaRPr lang="en-US"/>
           </a:p>
@@ -2762,7 +2795,7 @@
             <a:fld id="{84F61AEA-5DA7-4883-91E9-49E96185C8F3}" type="datetimeFigureOut">
               <a:rPr lang="en-US" smtClean="0"/>
               <a:pPr/>
-              <a:t>5/28/2025</a:t>
+              <a:t>7/3/2025</a:t>
             </a:fld>
             <a:endParaRPr lang="en-US"/>
           </a:p>
@@ -3135,7 +3168,13 @@
       </p:grpSpPr>
       <p:sp>
         <p:nvSpPr>
-          <p:cNvPr id="2" name="Title 1"/>
+          <p:cNvPr id="2" name="Title 1">
+            <a:extLst>
+              <a:ext uri="{FF2B5EF4-FFF2-40B4-BE49-F238E27FC236}">
+                <a16:creationId xmlns:a16="http://schemas.microsoft.com/office/drawing/2014/main" id="{3C570BC0-43B9-0493-1280-F357497B6FD2}"/>
+              </a:ext>
+            </a:extLst>
+          </p:cNvPr>
           <p:cNvSpPr>
             <a:spLocks noGrp="1"/>
           </p:cNvSpPr>
@@ -3148,13 +3187,22 @@
           <a:bodyPr/>
           <a:lstStyle/>
           <a:p>
-            <a:endParaRPr lang="en-US"/>
-          </a:p>
-        </p:txBody>
-      </p:sp>
-      <p:sp>
-        <p:nvSpPr>
-          <p:cNvPr id="3" name="Subtitle 2"/>
+            <a:r>
+              <a:rPr lang="en-US" dirty="0"/>
+              <a:t>Lecture 34</a:t>
+            </a:r>
+          </a:p>
+        </p:txBody>
+      </p:sp>
+      <p:sp>
+        <p:nvSpPr>
+          <p:cNvPr id="3" name="Subtitle 2">
+            <a:extLst>
+              <a:ext uri="{FF2B5EF4-FFF2-40B4-BE49-F238E27FC236}">
+                <a16:creationId xmlns:a16="http://schemas.microsoft.com/office/drawing/2014/main" id="{107D170C-7A11-4A67-A3A7-0E925241C0CA}"/>
+              </a:ext>
+            </a:extLst>
+          </p:cNvPr>
           <p:cNvSpPr>
             <a:spLocks noGrp="1"/>
           </p:cNvSpPr>
@@ -3171,9 +3219,39 @@
           </a:p>
         </p:txBody>
       </p:sp>
+    </p:spTree>
+    <p:extLst>
+      <p:ext uri="{BB962C8B-B14F-4D97-AF65-F5344CB8AC3E}">
+        <p14:creationId xmlns:p14="http://schemas.microsoft.com/office/powerpoint/2010/main" val="1011100621"/>
+      </p:ext>
+    </p:extLst>
+  </p:cSld>
+  <p:clrMapOvr>
+    <a:masterClrMapping/>
+  </p:clrMapOvr>
+</p:sld>
+</file>
+
+<file path=ppt/slides/slide10.xml><?xml version="1.0" encoding="utf-8"?>
+<p:sld xmlns:a="http://schemas.openxmlformats.org/drawingml/2006/main" xmlns:r="http://schemas.openxmlformats.org/officeDocument/2006/relationships" xmlns:p="http://schemas.openxmlformats.org/presentationml/2006/main">
+  <p:cSld>
+    <p:spTree>
+      <p:nvGrpSpPr>
+        <p:cNvPr id="1" name=""/>
+        <p:cNvGrpSpPr/>
+        <p:nvPr/>
+      </p:nvGrpSpPr>
+      <p:grpSpPr>
+        <a:xfrm>
+          <a:off x="0" y="0"/>
+          <a:ext cx="0" cy="0"/>
+          <a:chOff x="0" y="0"/>
+          <a:chExt cx="0" cy="0"/>
+        </a:xfrm>
+      </p:grpSpPr>
       <p:pic>
         <p:nvPicPr>
-          <p:cNvPr id="1026" name="Picture 2"/>
+          <p:cNvPr id="2" name="Picture 2"/>
           <p:cNvPicPr>
             <a:picLocks noChangeAspect="1" noChangeArrowheads="1"/>
           </p:cNvPicPr>
@@ -3181,15 +3259,15 @@
         </p:nvPicPr>
         <p:blipFill>
           <a:blip r:embed="rId2" cstate="print"/>
-          <a:srcRect/>
+          <a:srcRect r="52471" b="55168"/>
           <a:stretch>
             <a:fillRect/>
           </a:stretch>
         </p:blipFill>
         <p:spPr bwMode="auto">
           <a:xfrm>
-            <a:off x="2405183" y="0"/>
-            <a:ext cx="4080562" cy="5778864"/>
+            <a:off x="1556990" y="781986"/>
+            <a:ext cx="4337892" cy="5794693"/>
           </a:xfrm>
           <a:prstGeom prst="rect">
             <a:avLst/>
@@ -3205,33 +3283,425 @@
       </p:pic>
       <p:sp>
         <p:nvSpPr>
-          <p:cNvPr id="5" name="Rectangle 4"/>
-          <p:cNvSpPr/>
-          <p:nvPr/>
-        </p:nvSpPr>
-        <p:spPr>
-          <a:xfrm>
-            <a:off x="2241029" y="6013927"/>
-            <a:ext cx="4572000" cy="646331"/>
+          <p:cNvPr id="7" name="TextBox 6"/>
+          <p:cNvSpPr txBox="1"/>
+          <p:nvPr/>
+        </p:nvSpPr>
+        <p:spPr>
+          <a:xfrm>
+            <a:off x="-26981" y="2127855"/>
+            <a:ext cx="1125010" cy="1384995"/>
           </a:xfrm>
           <a:prstGeom prst="rect">
             <a:avLst/>
           </a:prstGeom>
-        </p:spPr>
-        <p:txBody>
-          <a:bodyPr>
+          <a:noFill/>
+        </p:spPr>
+        <p:txBody>
+          <a:bodyPr wrap="square" rtlCol="0">
             <a:spAutoFit/>
           </a:bodyPr>
           <a:lstStyle/>
           <a:p>
             <a:r>
-              <a:rPr lang="en-US" i="1" dirty="0"/>
-              <a:t>Manual of Driving and Maintenance for Mechanical Vehicles (Wheeled)</a:t>
-            </a:r>
-            <a:endParaRPr lang="en-US" dirty="0"/>
-          </a:p>
-        </p:txBody>
-      </p:sp>
+              <a:rPr lang="en-US" sz="2800" dirty="0"/>
+              <a:t>Intake valve opens</a:t>
+            </a:r>
+          </a:p>
+        </p:txBody>
+      </p:sp>
+      <p:sp>
+        <p:nvSpPr>
+          <p:cNvPr id="8" name="Arc 7"/>
+          <p:cNvSpPr/>
+          <p:nvPr/>
+        </p:nvSpPr>
+        <p:spPr>
+          <a:xfrm>
+            <a:off x="3001779" y="4137285"/>
+            <a:ext cx="2068643" cy="2383436"/>
+          </a:xfrm>
+          <a:prstGeom prst="arc">
+            <a:avLst>
+              <a:gd name="adj1" fmla="val 21573557"/>
+              <a:gd name="adj2" fmla="val 5439512"/>
+            </a:avLst>
+          </a:prstGeom>
+          <a:ln>
+            <a:solidFill>
+              <a:srgbClr val="FF0000"/>
+            </a:solidFill>
+            <a:headEnd type="none" w="med" len="med"/>
+            <a:tailEnd type="triangle" w="lg" len="lg"/>
+          </a:ln>
+        </p:spPr>
+        <p:style>
+          <a:lnRef idx="1">
+            <a:schemeClr val="accent1"/>
+          </a:lnRef>
+          <a:fillRef idx="0">
+            <a:schemeClr val="accent1"/>
+          </a:fillRef>
+          <a:effectRef idx="0">
+            <a:schemeClr val="accent1"/>
+          </a:effectRef>
+          <a:fontRef idx="minor">
+            <a:schemeClr val="tx1"/>
+          </a:fontRef>
+        </p:style>
+        <p:txBody>
+          <a:bodyPr rtlCol="0" anchor="ctr"/>
+          <a:lstStyle/>
+          <a:p>
+            <a:pPr algn="ctr"/>
+            <a:endParaRPr lang="en-US"/>
+          </a:p>
+        </p:txBody>
+      </p:sp>
+      <p:sp>
+        <p:nvSpPr>
+          <p:cNvPr id="11" name="Freeform 10"/>
+          <p:cNvSpPr/>
+          <p:nvPr/>
+        </p:nvSpPr>
+        <p:spPr>
+          <a:xfrm>
+            <a:off x="1262921" y="1858780"/>
+            <a:ext cx="1259174" cy="884420"/>
+          </a:xfrm>
+          <a:custGeom>
+            <a:avLst/>
+            <a:gdLst>
+              <a:gd name="connsiteX0" fmla="*/ 1259174 w 1259174"/>
+              <a:gd name="connsiteY0" fmla="*/ 0 h 884420"/>
+              <a:gd name="connsiteX1" fmla="*/ 794479 w 1259174"/>
+              <a:gd name="connsiteY1" fmla="*/ 284813 h 884420"/>
+              <a:gd name="connsiteX2" fmla="*/ 914400 w 1259174"/>
+              <a:gd name="connsiteY2" fmla="*/ 299803 h 884420"/>
+              <a:gd name="connsiteX3" fmla="*/ 0 w 1259174"/>
+              <a:gd name="connsiteY3" fmla="*/ 884420 h 884420"/>
+            </a:gdLst>
+            <a:ahLst/>
+            <a:cxnLst>
+              <a:cxn ang="0">
+                <a:pos x="connsiteX0" y="connsiteY0"/>
+              </a:cxn>
+              <a:cxn ang="0">
+                <a:pos x="connsiteX1" y="connsiteY1"/>
+              </a:cxn>
+              <a:cxn ang="0">
+                <a:pos x="connsiteX2" y="connsiteY2"/>
+              </a:cxn>
+              <a:cxn ang="0">
+                <a:pos x="connsiteX3" y="connsiteY3"/>
+              </a:cxn>
+            </a:cxnLst>
+            <a:rect l="l" t="t" r="r" b="b"/>
+            <a:pathLst>
+              <a:path w="1259174" h="884420">
+                <a:moveTo>
+                  <a:pt x="1259174" y="0"/>
+                </a:moveTo>
+                <a:cubicBezTo>
+                  <a:pt x="1055557" y="117423"/>
+                  <a:pt x="851941" y="234846"/>
+                  <a:pt x="794479" y="284813"/>
+                </a:cubicBezTo>
+                <a:cubicBezTo>
+                  <a:pt x="737017" y="334780"/>
+                  <a:pt x="1046813" y="199869"/>
+                  <a:pt x="914400" y="299803"/>
+                </a:cubicBezTo>
+                <a:cubicBezTo>
+                  <a:pt x="781987" y="399738"/>
+                  <a:pt x="154898" y="791981"/>
+                  <a:pt x="0" y="884420"/>
+                </a:cubicBezTo>
+              </a:path>
+            </a:pathLst>
+          </a:custGeom>
+          <a:ln w="28575">
+            <a:solidFill>
+              <a:srgbClr val="FFC000"/>
+            </a:solidFill>
+            <a:headEnd type="triangle" w="med" len="med"/>
+            <a:tailEnd type="none" w="med" len="med"/>
+          </a:ln>
+        </p:spPr>
+        <p:style>
+          <a:lnRef idx="1">
+            <a:schemeClr val="accent1"/>
+          </a:lnRef>
+          <a:fillRef idx="0">
+            <a:schemeClr val="accent1"/>
+          </a:fillRef>
+          <a:effectRef idx="0">
+            <a:schemeClr val="accent1"/>
+          </a:effectRef>
+          <a:fontRef idx="minor">
+            <a:schemeClr val="tx1"/>
+          </a:fontRef>
+        </p:style>
+        <p:txBody>
+          <a:bodyPr rtlCol="0" anchor="ctr"/>
+          <a:lstStyle/>
+          <a:p>
+            <a:pPr algn="ctr"/>
+            <a:endParaRPr lang="en-US"/>
+          </a:p>
+        </p:txBody>
+      </p:sp>
+      <p:cxnSp>
+        <p:nvCxnSpPr>
+          <p:cNvPr id="13" name="Straight Arrow Connector 12"/>
+          <p:cNvCxnSpPr/>
+          <p:nvPr/>
+        </p:nvCxnSpPr>
+        <p:spPr>
+          <a:xfrm>
+            <a:off x="3616376" y="2863121"/>
+            <a:ext cx="0" cy="464695"/>
+          </a:xfrm>
+          <a:prstGeom prst="straightConnector1">
+            <a:avLst/>
+          </a:prstGeom>
+          <a:ln w="28575">
+            <a:solidFill>
+              <a:srgbClr val="FF0000"/>
+            </a:solidFill>
+            <a:tailEnd type="arrow"/>
+          </a:ln>
+        </p:spPr>
+        <p:style>
+          <a:lnRef idx="1">
+            <a:schemeClr val="accent1"/>
+          </a:lnRef>
+          <a:fillRef idx="0">
+            <a:schemeClr val="accent1"/>
+          </a:fillRef>
+          <a:effectRef idx="0">
+            <a:schemeClr val="accent1"/>
+          </a:effectRef>
+          <a:fontRef idx="minor">
+            <a:schemeClr val="tx1"/>
+          </a:fontRef>
+        </p:style>
+      </p:cxnSp>
+      <p:sp>
+        <p:nvSpPr>
+          <p:cNvPr id="14" name="TextBox 13"/>
+          <p:cNvSpPr txBox="1"/>
+          <p:nvPr/>
+        </p:nvSpPr>
+        <p:spPr>
+          <a:xfrm>
+            <a:off x="635083" y="4273947"/>
+            <a:ext cx="1302395" cy="954107"/>
+          </a:xfrm>
+          <a:prstGeom prst="rect">
+            <a:avLst/>
+          </a:prstGeom>
+          <a:noFill/>
+        </p:spPr>
+        <p:txBody>
+          <a:bodyPr wrap="square" rtlCol="0">
+            <a:spAutoFit/>
+          </a:bodyPr>
+          <a:lstStyle/>
+          <a:p>
+            <a:r>
+              <a:rPr lang="en-US" sz="2800" dirty="0"/>
+              <a:t>Piston Lowers</a:t>
+            </a:r>
+          </a:p>
+        </p:txBody>
+      </p:sp>
+      <p:sp>
+        <p:nvSpPr>
+          <p:cNvPr id="15" name="Freeform 14"/>
+          <p:cNvSpPr/>
+          <p:nvPr/>
+        </p:nvSpPr>
+        <p:spPr>
+          <a:xfrm>
+            <a:off x="1802567" y="3285343"/>
+            <a:ext cx="1666406" cy="1346617"/>
+          </a:xfrm>
+          <a:custGeom>
+            <a:avLst/>
+            <a:gdLst>
+              <a:gd name="connsiteX0" fmla="*/ 1259174 w 1259174"/>
+              <a:gd name="connsiteY0" fmla="*/ 0 h 884420"/>
+              <a:gd name="connsiteX1" fmla="*/ 794479 w 1259174"/>
+              <a:gd name="connsiteY1" fmla="*/ 284813 h 884420"/>
+              <a:gd name="connsiteX2" fmla="*/ 914400 w 1259174"/>
+              <a:gd name="connsiteY2" fmla="*/ 299803 h 884420"/>
+              <a:gd name="connsiteX3" fmla="*/ 0 w 1259174"/>
+              <a:gd name="connsiteY3" fmla="*/ 884420 h 884420"/>
+            </a:gdLst>
+            <a:ahLst/>
+            <a:cxnLst>
+              <a:cxn ang="0">
+                <a:pos x="connsiteX0" y="connsiteY0"/>
+              </a:cxn>
+              <a:cxn ang="0">
+                <a:pos x="connsiteX1" y="connsiteY1"/>
+              </a:cxn>
+              <a:cxn ang="0">
+                <a:pos x="connsiteX2" y="connsiteY2"/>
+              </a:cxn>
+              <a:cxn ang="0">
+                <a:pos x="connsiteX3" y="connsiteY3"/>
+              </a:cxn>
+            </a:cxnLst>
+            <a:rect l="l" t="t" r="r" b="b"/>
+            <a:pathLst>
+              <a:path w="1259174" h="884420">
+                <a:moveTo>
+                  <a:pt x="1259174" y="0"/>
+                </a:moveTo>
+                <a:cubicBezTo>
+                  <a:pt x="1055557" y="117423"/>
+                  <a:pt x="851941" y="234846"/>
+                  <a:pt x="794479" y="284813"/>
+                </a:cubicBezTo>
+                <a:cubicBezTo>
+                  <a:pt x="737017" y="334780"/>
+                  <a:pt x="1046813" y="199869"/>
+                  <a:pt x="914400" y="299803"/>
+                </a:cubicBezTo>
+                <a:cubicBezTo>
+                  <a:pt x="781987" y="399738"/>
+                  <a:pt x="154898" y="791981"/>
+                  <a:pt x="0" y="884420"/>
+                </a:cubicBezTo>
+              </a:path>
+            </a:pathLst>
+          </a:custGeom>
+          <a:ln w="28575">
+            <a:solidFill>
+              <a:srgbClr val="FFC000"/>
+            </a:solidFill>
+            <a:headEnd type="triangle" w="med" len="med"/>
+            <a:tailEnd type="none" w="med" len="med"/>
+          </a:ln>
+        </p:spPr>
+        <p:style>
+          <a:lnRef idx="1">
+            <a:schemeClr val="accent1"/>
+          </a:lnRef>
+          <a:fillRef idx="0">
+            <a:schemeClr val="accent1"/>
+          </a:fillRef>
+          <a:effectRef idx="0">
+            <a:schemeClr val="accent1"/>
+          </a:effectRef>
+          <a:fontRef idx="minor">
+            <a:schemeClr val="tx1"/>
+          </a:fontRef>
+        </p:style>
+        <p:txBody>
+          <a:bodyPr rtlCol="0" anchor="ctr"/>
+          <a:lstStyle/>
+          <a:p>
+            <a:pPr algn="ctr"/>
+            <a:endParaRPr lang="en-US"/>
+          </a:p>
+        </p:txBody>
+      </p:sp>
+      <p:sp>
+        <p:nvSpPr>
+          <p:cNvPr id="16" name="TextBox 15"/>
+          <p:cNvSpPr txBox="1"/>
+          <p:nvPr/>
+        </p:nvSpPr>
+        <p:spPr>
+          <a:xfrm>
+            <a:off x="2477125" y="224104"/>
+            <a:ext cx="2698230" cy="707886"/>
+          </a:xfrm>
+          <a:prstGeom prst="rect">
+            <a:avLst/>
+          </a:prstGeom>
+          <a:noFill/>
+        </p:spPr>
+        <p:txBody>
+          <a:bodyPr wrap="square" rtlCol="0">
+            <a:spAutoFit/>
+          </a:bodyPr>
+          <a:lstStyle/>
+          <a:p>
+            <a:r>
+              <a:rPr lang="en-US" sz="4000" dirty="0"/>
+              <a:t>Process IA</a:t>
+            </a:r>
+          </a:p>
+        </p:txBody>
+      </p:sp>
+      <p:pic>
+        <p:nvPicPr>
+          <p:cNvPr id="10" name="Picture 5"/>
+          <p:cNvPicPr>
+            <a:picLocks noChangeAspect="1" noChangeArrowheads="1"/>
+          </p:cNvPicPr>
+          <p:nvPr/>
+        </p:nvPicPr>
+        <p:blipFill>
+          <a:blip r:embed="rId3" cstate="print">
+            <a:extLst>
+              <a:ext uri="{28A0092B-C50C-407E-A947-70E740481C1C}">
+                <a14:useLocalDpi xmlns:a14="http://schemas.microsoft.com/office/drawing/2010/main" val="0"/>
+              </a:ext>
+            </a:extLst>
+          </a:blip>
+          <a:srcRect/>
+          <a:stretch>
+            <a:fillRect/>
+          </a:stretch>
+        </p:blipFill>
+        <p:spPr bwMode="auto">
+          <a:xfrm>
+            <a:off x="6034582" y="1845897"/>
+            <a:ext cx="2969718" cy="2599103"/>
+          </a:xfrm>
+          <a:prstGeom prst="rect">
+            <a:avLst/>
+          </a:prstGeom>
+          <a:noFill/>
+          <a:ln>
+            <a:noFill/>
+          </a:ln>
+          <a:effectLst/>
+          <a:extLst>
+            <a:ext uri="{909E8E84-426E-40DD-AFC4-6F175D3DCCD1}">
+              <a14:hiddenFill xmlns:a14="http://schemas.microsoft.com/office/drawing/2010/main">
+                <a:solidFill>
+                  <a:schemeClr val="accent1"/>
+                </a:solidFill>
+              </a14:hiddenFill>
+            </a:ext>
+            <a:ext uri="{91240B29-F687-4F45-9708-019B960494DF}">
+              <a14:hiddenLine xmlns:a14="http://schemas.microsoft.com/office/drawing/2010/main" w="9525">
+                <a:solidFill>
+                  <a:schemeClr val="tx1"/>
+                </a:solidFill>
+                <a:miter lim="800000"/>
+                <a:headEnd/>
+                <a:tailEnd/>
+              </a14:hiddenLine>
+            </a:ext>
+            <a:ext uri="{AF507438-7753-43E0-B8FC-AC1667EBCBE1}">
+              <a14:hiddenEffects xmlns:a14="http://schemas.microsoft.com/office/drawing/2010/main">
+                <a:effectLst>
+                  <a:outerShdw dist="35921" dir="2700000" algn="ctr" rotWithShape="0">
+                    <a:schemeClr val="bg2"/>
+                  </a:outerShdw>
+                </a:effectLst>
+              </a14:hiddenEffects>
+            </a:ext>
+          </a:extLst>
+        </p:spPr>
+      </p:pic>
     </p:spTree>
   </p:cSld>
   <p:clrMapOvr>
@@ -3240,7 +3710,1093 @@
 </p:sld>
 </file>
 
-<file path=ppt/slides/slide10.xml><?xml version="1.0" encoding="utf-8"?>
+<file path=ppt/slides/slide11.xml><?xml version="1.0" encoding="utf-8"?>
+<p:sld xmlns:a="http://schemas.openxmlformats.org/drawingml/2006/main" xmlns:r="http://schemas.openxmlformats.org/officeDocument/2006/relationships" xmlns:p="http://schemas.openxmlformats.org/presentationml/2006/main">
+  <p:cSld>
+    <p:spTree>
+      <p:nvGrpSpPr>
+        <p:cNvPr id="1" name=""/>
+        <p:cNvGrpSpPr/>
+        <p:nvPr/>
+      </p:nvGrpSpPr>
+      <p:grpSpPr>
+        <a:xfrm>
+          <a:off x="0" y="0"/>
+          <a:ext cx="0" cy="0"/>
+          <a:chOff x="0" y="0"/>
+          <a:chExt cx="0" cy="0"/>
+        </a:xfrm>
+      </p:grpSpPr>
+      <p:pic>
+        <p:nvPicPr>
+          <p:cNvPr id="7170" name="Picture 2"/>
+          <p:cNvPicPr>
+            <a:picLocks noChangeAspect="1" noChangeArrowheads="1"/>
+          </p:cNvPicPr>
+          <p:nvPr/>
+        </p:nvPicPr>
+        <p:blipFill>
+          <a:blip r:embed="rId2">
+            <a:extLst>
+              <a:ext uri="{28A0092B-C50C-407E-A947-70E740481C1C}">
+                <a14:useLocalDpi xmlns:a14="http://schemas.microsoft.com/office/drawing/2010/main" val="0"/>
+              </a:ext>
+            </a:extLst>
+          </a:blip>
+          <a:srcRect/>
+          <a:stretch>
+            <a:fillRect/>
+          </a:stretch>
+        </p:blipFill>
+        <p:spPr bwMode="auto">
+          <a:xfrm>
+            <a:off x="791282" y="363474"/>
+            <a:ext cx="7055444" cy="5719826"/>
+          </a:xfrm>
+          <a:prstGeom prst="rect">
+            <a:avLst/>
+          </a:prstGeom>
+          <a:noFill/>
+          <a:ln>
+            <a:noFill/>
+          </a:ln>
+          <a:effectLst/>
+          <a:extLst>
+            <a:ext uri="{909E8E84-426E-40DD-AFC4-6F175D3DCCD1}">
+              <a14:hiddenFill xmlns:a14="http://schemas.microsoft.com/office/drawing/2010/main">
+                <a:solidFill>
+                  <a:schemeClr val="accent1"/>
+                </a:solidFill>
+              </a14:hiddenFill>
+            </a:ext>
+            <a:ext uri="{91240B29-F687-4F45-9708-019B960494DF}">
+              <a14:hiddenLine xmlns:a14="http://schemas.microsoft.com/office/drawing/2010/main" w="9525">
+                <a:solidFill>
+                  <a:schemeClr val="tx1"/>
+                </a:solidFill>
+                <a:miter lim="800000"/>
+                <a:headEnd/>
+                <a:tailEnd/>
+              </a14:hiddenLine>
+            </a:ext>
+            <a:ext uri="{AF507438-7753-43E0-B8FC-AC1667EBCBE1}">
+              <a14:hiddenEffects xmlns:a14="http://schemas.microsoft.com/office/drawing/2010/main">
+                <a:effectLst>
+                  <a:outerShdw dist="35921" dir="2700000" algn="ctr" rotWithShape="0">
+                    <a:schemeClr val="bg2"/>
+                  </a:outerShdw>
+                </a:effectLst>
+              </a14:hiddenEffects>
+            </a:ext>
+          </a:extLst>
+        </p:spPr>
+      </p:pic>
+      <p:sp>
+        <p:nvSpPr>
+          <p:cNvPr id="6" name="TextBox 5"/>
+          <p:cNvSpPr txBox="1"/>
+          <p:nvPr/>
+        </p:nvSpPr>
+        <p:spPr>
+          <a:xfrm rot="16200000">
+            <a:off x="-401330" y="2839730"/>
+            <a:ext cx="2087879" cy="523220"/>
+          </a:xfrm>
+          <a:prstGeom prst="rect">
+            <a:avLst/>
+          </a:prstGeom>
+          <a:noFill/>
+        </p:spPr>
+        <p:txBody>
+          <a:bodyPr wrap="none" rtlCol="0">
+            <a:spAutoFit/>
+          </a:bodyPr>
+          <a:lstStyle/>
+          <a:p>
+            <a:r>
+              <a:rPr lang="en-US" sz="2800" dirty="0"/>
+              <a:t>Pressure (Pa)</a:t>
+            </a:r>
+          </a:p>
+        </p:txBody>
+      </p:sp>
+      <p:sp>
+        <p:nvSpPr>
+          <p:cNvPr id="7" name="TextBox 6"/>
+          <p:cNvSpPr txBox="1"/>
+          <p:nvPr/>
+        </p:nvSpPr>
+        <p:spPr>
+          <a:xfrm>
+            <a:off x="3657600" y="6334780"/>
+            <a:ext cx="2067554" cy="523220"/>
+          </a:xfrm>
+          <a:prstGeom prst="rect">
+            <a:avLst/>
+          </a:prstGeom>
+          <a:noFill/>
+        </p:spPr>
+        <p:txBody>
+          <a:bodyPr wrap="none" rtlCol="0">
+            <a:spAutoFit/>
+          </a:bodyPr>
+          <a:lstStyle/>
+          <a:p>
+            <a:r>
+              <a:rPr lang="en-US" sz="2800" dirty="0"/>
+              <a:t>Volume (m</a:t>
+            </a:r>
+            <a:r>
+              <a:rPr lang="en-US" sz="2800" baseline="30000" dirty="0"/>
+              <a:t>3</a:t>
+            </a:r>
+            <a:r>
+              <a:rPr lang="en-US" sz="2800" dirty="0"/>
+              <a:t>)</a:t>
+            </a:r>
+          </a:p>
+        </p:txBody>
+      </p:sp>
+      <p:sp>
+        <p:nvSpPr>
+          <p:cNvPr id="8" name="Oval 7"/>
+          <p:cNvSpPr/>
+          <p:nvPr/>
+        </p:nvSpPr>
+        <p:spPr>
+          <a:xfrm>
+            <a:off x="2251020" y="914400"/>
+            <a:ext cx="152400" cy="152400"/>
+          </a:xfrm>
+          <a:prstGeom prst="ellipse">
+            <a:avLst/>
+          </a:prstGeom>
+          <a:solidFill>
+            <a:srgbClr val="FF0000"/>
+          </a:solidFill>
+          <a:ln>
+            <a:noFill/>
+          </a:ln>
+        </p:spPr>
+        <p:style>
+          <a:lnRef idx="2">
+            <a:schemeClr val="accent1">
+              <a:shade val="50000"/>
+            </a:schemeClr>
+          </a:lnRef>
+          <a:fillRef idx="1">
+            <a:schemeClr val="accent1"/>
+          </a:fillRef>
+          <a:effectRef idx="0">
+            <a:schemeClr val="accent1"/>
+          </a:effectRef>
+          <a:fontRef idx="minor">
+            <a:schemeClr val="lt1"/>
+          </a:fontRef>
+        </p:style>
+        <p:txBody>
+          <a:bodyPr rtlCol="0" anchor="ctr"/>
+          <a:lstStyle/>
+          <a:p>
+            <a:pPr algn="ctr"/>
+            <a:endParaRPr lang="en-US"/>
+          </a:p>
+        </p:txBody>
+      </p:sp>
+      <p:sp>
+        <p:nvSpPr>
+          <p:cNvPr id="9" name="Oval 8"/>
+          <p:cNvSpPr/>
+          <p:nvPr/>
+        </p:nvSpPr>
+        <p:spPr>
+          <a:xfrm>
+            <a:off x="2251020" y="2490850"/>
+            <a:ext cx="152400" cy="152400"/>
+          </a:xfrm>
+          <a:prstGeom prst="ellipse">
+            <a:avLst/>
+          </a:prstGeom>
+          <a:solidFill>
+            <a:srgbClr val="FF0000"/>
+          </a:solidFill>
+          <a:ln>
+            <a:noFill/>
+          </a:ln>
+        </p:spPr>
+        <p:style>
+          <a:lnRef idx="2">
+            <a:schemeClr val="accent1">
+              <a:shade val="50000"/>
+            </a:schemeClr>
+          </a:lnRef>
+          <a:fillRef idx="1">
+            <a:schemeClr val="accent1"/>
+          </a:fillRef>
+          <a:effectRef idx="0">
+            <a:schemeClr val="accent1"/>
+          </a:effectRef>
+          <a:fontRef idx="minor">
+            <a:schemeClr val="lt1"/>
+          </a:fontRef>
+        </p:style>
+        <p:txBody>
+          <a:bodyPr rtlCol="0" anchor="ctr"/>
+          <a:lstStyle/>
+          <a:p>
+            <a:pPr algn="ctr"/>
+            <a:endParaRPr lang="en-US"/>
+          </a:p>
+        </p:txBody>
+      </p:sp>
+      <p:sp>
+        <p:nvSpPr>
+          <p:cNvPr id="10" name="Oval 9"/>
+          <p:cNvSpPr/>
+          <p:nvPr/>
+        </p:nvSpPr>
+        <p:spPr>
+          <a:xfrm>
+            <a:off x="2251020" y="5356469"/>
+            <a:ext cx="152400" cy="152400"/>
+          </a:xfrm>
+          <a:prstGeom prst="ellipse">
+            <a:avLst/>
+          </a:prstGeom>
+          <a:solidFill>
+            <a:srgbClr val="FF0000"/>
+          </a:solidFill>
+          <a:ln>
+            <a:noFill/>
+          </a:ln>
+        </p:spPr>
+        <p:style>
+          <a:lnRef idx="2">
+            <a:schemeClr val="accent1">
+              <a:shade val="50000"/>
+            </a:schemeClr>
+          </a:lnRef>
+          <a:fillRef idx="1">
+            <a:schemeClr val="accent1"/>
+          </a:fillRef>
+          <a:effectRef idx="0">
+            <a:schemeClr val="accent1"/>
+          </a:effectRef>
+          <a:fontRef idx="minor">
+            <a:schemeClr val="lt1"/>
+          </a:fontRef>
+        </p:style>
+        <p:txBody>
+          <a:bodyPr rtlCol="0" anchor="ctr"/>
+          <a:lstStyle/>
+          <a:p>
+            <a:pPr algn="ctr"/>
+            <a:endParaRPr lang="en-US"/>
+          </a:p>
+        </p:txBody>
+      </p:sp>
+      <p:sp>
+        <p:nvSpPr>
+          <p:cNvPr id="11" name="Oval 10"/>
+          <p:cNvSpPr/>
+          <p:nvPr/>
+        </p:nvSpPr>
+        <p:spPr>
+          <a:xfrm>
+            <a:off x="7353919" y="5254036"/>
+            <a:ext cx="152400" cy="152400"/>
+          </a:xfrm>
+          <a:prstGeom prst="ellipse">
+            <a:avLst/>
+          </a:prstGeom>
+          <a:solidFill>
+            <a:srgbClr val="FF0000"/>
+          </a:solidFill>
+          <a:ln>
+            <a:noFill/>
+          </a:ln>
+        </p:spPr>
+        <p:style>
+          <a:lnRef idx="2">
+            <a:schemeClr val="accent1">
+              <a:shade val="50000"/>
+            </a:schemeClr>
+          </a:lnRef>
+          <a:fillRef idx="1">
+            <a:schemeClr val="accent1"/>
+          </a:fillRef>
+          <a:effectRef idx="0">
+            <a:schemeClr val="accent1"/>
+          </a:effectRef>
+          <a:fontRef idx="minor">
+            <a:schemeClr val="lt1"/>
+          </a:fontRef>
+        </p:style>
+        <p:txBody>
+          <a:bodyPr rtlCol="0" anchor="ctr"/>
+          <a:lstStyle/>
+          <a:p>
+            <a:pPr algn="ctr"/>
+            <a:endParaRPr lang="en-US"/>
+          </a:p>
+        </p:txBody>
+      </p:sp>
+      <p:sp>
+        <p:nvSpPr>
+          <p:cNvPr id="12" name="Oval 11"/>
+          <p:cNvSpPr/>
+          <p:nvPr/>
+        </p:nvSpPr>
+        <p:spPr>
+          <a:xfrm>
+            <a:off x="7353919" y="5361466"/>
+            <a:ext cx="152400" cy="152400"/>
+          </a:xfrm>
+          <a:prstGeom prst="ellipse">
+            <a:avLst/>
+          </a:prstGeom>
+          <a:solidFill>
+            <a:srgbClr val="FF0000"/>
+          </a:solidFill>
+          <a:ln>
+            <a:noFill/>
+          </a:ln>
+        </p:spPr>
+        <p:style>
+          <a:lnRef idx="2">
+            <a:schemeClr val="accent1">
+              <a:shade val="50000"/>
+            </a:schemeClr>
+          </a:lnRef>
+          <a:fillRef idx="1">
+            <a:schemeClr val="accent1"/>
+          </a:fillRef>
+          <a:effectRef idx="0">
+            <a:schemeClr val="accent1"/>
+          </a:effectRef>
+          <a:fontRef idx="minor">
+            <a:schemeClr val="lt1"/>
+          </a:fontRef>
+        </p:style>
+        <p:txBody>
+          <a:bodyPr rtlCol="0" anchor="ctr"/>
+          <a:lstStyle/>
+          <a:p>
+            <a:pPr algn="ctr"/>
+            <a:endParaRPr lang="en-US"/>
+          </a:p>
+        </p:txBody>
+      </p:sp>
+      <p:sp>
+        <p:nvSpPr>
+          <p:cNvPr id="14" name="TextBox 13"/>
+          <p:cNvSpPr txBox="1"/>
+          <p:nvPr/>
+        </p:nvSpPr>
+        <p:spPr>
+          <a:xfrm>
+            <a:off x="7944786" y="5741233"/>
+            <a:ext cx="421910" cy="584775"/>
+          </a:xfrm>
+          <a:prstGeom prst="rect">
+            <a:avLst/>
+          </a:prstGeom>
+          <a:noFill/>
+        </p:spPr>
+        <p:txBody>
+          <a:bodyPr wrap="none" rtlCol="0">
+            <a:spAutoFit/>
+          </a:bodyPr>
+          <a:lstStyle/>
+          <a:p>
+            <a:r>
+              <a:rPr lang="en-US" sz="3200" dirty="0">
+                <a:solidFill>
+                  <a:srgbClr val="FF0000"/>
+                </a:solidFill>
+              </a:rPr>
+              <a:t>A</a:t>
+            </a:r>
+          </a:p>
+        </p:txBody>
+      </p:sp>
+      <p:cxnSp>
+        <p:nvCxnSpPr>
+          <p:cNvPr id="16" name="Straight Arrow Connector 15"/>
+          <p:cNvCxnSpPr/>
+          <p:nvPr/>
+        </p:nvCxnSpPr>
+        <p:spPr>
+          <a:xfrm flipH="1" flipV="1">
+            <a:off x="7495081" y="5546362"/>
+            <a:ext cx="389745" cy="374753"/>
+          </a:xfrm>
+          <a:prstGeom prst="straightConnector1">
+            <a:avLst/>
+          </a:prstGeom>
+          <a:ln>
+            <a:tailEnd type="arrow"/>
+          </a:ln>
+        </p:spPr>
+        <p:style>
+          <a:lnRef idx="1">
+            <a:schemeClr val="accent1"/>
+          </a:lnRef>
+          <a:fillRef idx="0">
+            <a:schemeClr val="accent1"/>
+          </a:fillRef>
+          <a:effectRef idx="0">
+            <a:schemeClr val="accent1"/>
+          </a:effectRef>
+          <a:fontRef idx="minor">
+            <a:schemeClr val="tx1"/>
+          </a:fontRef>
+        </p:style>
+      </p:cxnSp>
+      <p:sp>
+        <p:nvSpPr>
+          <p:cNvPr id="17" name="TextBox 16"/>
+          <p:cNvSpPr txBox="1"/>
+          <p:nvPr/>
+        </p:nvSpPr>
+        <p:spPr>
+          <a:xfrm>
+            <a:off x="7557540" y="4424598"/>
+            <a:ext cx="437940" cy="584775"/>
+          </a:xfrm>
+          <a:prstGeom prst="rect">
+            <a:avLst/>
+          </a:prstGeom>
+          <a:noFill/>
+        </p:spPr>
+        <p:txBody>
+          <a:bodyPr wrap="none" rtlCol="0">
+            <a:spAutoFit/>
+          </a:bodyPr>
+          <a:lstStyle/>
+          <a:p>
+            <a:r>
+              <a:rPr lang="en-US" sz="3200" dirty="0">
+                <a:solidFill>
+                  <a:srgbClr val="FF0000"/>
+                </a:solidFill>
+              </a:rPr>
+              <a:t>D</a:t>
+            </a:r>
+          </a:p>
+        </p:txBody>
+      </p:sp>
+      <p:cxnSp>
+        <p:nvCxnSpPr>
+          <p:cNvPr id="18" name="Straight Arrow Connector 17"/>
+          <p:cNvCxnSpPr/>
+          <p:nvPr/>
+        </p:nvCxnSpPr>
+        <p:spPr>
+          <a:xfrm flipH="1">
+            <a:off x="7510072" y="4946754"/>
+            <a:ext cx="104931" cy="269823"/>
+          </a:xfrm>
+          <a:prstGeom prst="straightConnector1">
+            <a:avLst/>
+          </a:prstGeom>
+          <a:ln>
+            <a:tailEnd type="arrow"/>
+          </a:ln>
+        </p:spPr>
+        <p:style>
+          <a:lnRef idx="1">
+            <a:schemeClr val="accent1"/>
+          </a:lnRef>
+          <a:fillRef idx="0">
+            <a:schemeClr val="accent1"/>
+          </a:fillRef>
+          <a:effectRef idx="0">
+            <a:schemeClr val="accent1"/>
+          </a:effectRef>
+          <a:fontRef idx="minor">
+            <a:schemeClr val="tx1"/>
+          </a:fontRef>
+        </p:style>
+      </p:cxnSp>
+      <p:sp>
+        <p:nvSpPr>
+          <p:cNvPr id="21" name="TextBox 20"/>
+          <p:cNvSpPr txBox="1"/>
+          <p:nvPr/>
+        </p:nvSpPr>
+        <p:spPr>
+          <a:xfrm>
+            <a:off x="1936228" y="2131104"/>
+            <a:ext cx="421910" cy="584775"/>
+          </a:xfrm>
+          <a:prstGeom prst="rect">
+            <a:avLst/>
+          </a:prstGeom>
+          <a:noFill/>
+        </p:spPr>
+        <p:txBody>
+          <a:bodyPr wrap="none" rtlCol="0">
+            <a:spAutoFit/>
+          </a:bodyPr>
+          <a:lstStyle/>
+          <a:p>
+            <a:r>
+              <a:rPr lang="en-US" sz="3200" dirty="0">
+                <a:solidFill>
+                  <a:srgbClr val="FF0000"/>
+                </a:solidFill>
+              </a:rPr>
+              <a:t>B</a:t>
+            </a:r>
+          </a:p>
+        </p:txBody>
+      </p:sp>
+      <p:sp>
+        <p:nvSpPr>
+          <p:cNvPr id="22" name="TextBox 21"/>
+          <p:cNvSpPr txBox="1"/>
+          <p:nvPr/>
+        </p:nvSpPr>
+        <p:spPr>
+          <a:xfrm>
+            <a:off x="2448393" y="784485"/>
+            <a:ext cx="404278" cy="584775"/>
+          </a:xfrm>
+          <a:prstGeom prst="rect">
+            <a:avLst/>
+          </a:prstGeom>
+          <a:noFill/>
+        </p:spPr>
+        <p:txBody>
+          <a:bodyPr wrap="none" rtlCol="0">
+            <a:spAutoFit/>
+          </a:bodyPr>
+          <a:lstStyle/>
+          <a:p>
+            <a:r>
+              <a:rPr lang="en-US" sz="3200" dirty="0">
+                <a:solidFill>
+                  <a:srgbClr val="FF0000"/>
+                </a:solidFill>
+              </a:rPr>
+              <a:t>C</a:t>
+            </a:r>
+          </a:p>
+        </p:txBody>
+      </p:sp>
+      <p:sp>
+        <p:nvSpPr>
+          <p:cNvPr id="23" name="TextBox 22"/>
+          <p:cNvSpPr txBox="1"/>
+          <p:nvPr/>
+        </p:nvSpPr>
+        <p:spPr>
+          <a:xfrm>
+            <a:off x="1941226" y="4954249"/>
+            <a:ext cx="320922" cy="584775"/>
+          </a:xfrm>
+          <a:prstGeom prst="rect">
+            <a:avLst/>
+          </a:prstGeom>
+          <a:noFill/>
+        </p:spPr>
+        <p:txBody>
+          <a:bodyPr wrap="none" rtlCol="0">
+            <a:spAutoFit/>
+          </a:bodyPr>
+          <a:lstStyle/>
+          <a:p>
+            <a:r>
+              <a:rPr lang="en-US" sz="3200" dirty="0">
+                <a:solidFill>
+                  <a:srgbClr val="FF0000"/>
+                </a:solidFill>
+                <a:latin typeface="Times" pitchFamily="18" charset="0"/>
+                <a:cs typeface="Times" pitchFamily="18" charset="0"/>
+              </a:rPr>
+              <a:t>I</a:t>
+            </a:r>
+          </a:p>
+        </p:txBody>
+      </p:sp>
+      <p:sp>
+        <p:nvSpPr>
+          <p:cNvPr id="19" name="Right Arrow 18"/>
+          <p:cNvSpPr/>
+          <p:nvPr/>
+        </p:nvSpPr>
+        <p:spPr>
+          <a:xfrm>
+            <a:off x="1124264" y="1499018"/>
+            <a:ext cx="1244184" cy="764499"/>
+          </a:xfrm>
+          <a:prstGeom prst="rightArrow">
+            <a:avLst>
+              <a:gd name="adj1" fmla="val 50000"/>
+              <a:gd name="adj2" fmla="val 55714"/>
+            </a:avLst>
+          </a:prstGeom>
+          <a:gradFill flip="none" rotWithShape="1">
+            <a:gsLst>
+              <a:gs pos="0">
+                <a:srgbClr val="FFC000">
+                  <a:tint val="66000"/>
+                  <a:satMod val="160000"/>
+                  <a:alpha val="53000"/>
+                </a:srgbClr>
+              </a:gs>
+              <a:gs pos="50000">
+                <a:srgbClr val="FFC000">
+                  <a:tint val="44500"/>
+                  <a:satMod val="160000"/>
+                </a:srgbClr>
+              </a:gs>
+              <a:gs pos="100000">
+                <a:srgbClr val="FFC000">
+                  <a:tint val="23500"/>
+                  <a:satMod val="160000"/>
+                </a:srgbClr>
+              </a:gs>
+            </a:gsLst>
+            <a:lin ang="10800000" scaled="1"/>
+            <a:tileRect/>
+          </a:gradFill>
+          <a:ln>
+            <a:noFill/>
+          </a:ln>
+        </p:spPr>
+        <p:style>
+          <a:lnRef idx="2">
+            <a:schemeClr val="accent1">
+              <a:shade val="50000"/>
+            </a:schemeClr>
+          </a:lnRef>
+          <a:fillRef idx="1">
+            <a:schemeClr val="accent1"/>
+          </a:fillRef>
+          <a:effectRef idx="0">
+            <a:schemeClr val="accent1"/>
+          </a:effectRef>
+          <a:fontRef idx="minor">
+            <a:schemeClr val="lt1"/>
+          </a:fontRef>
+        </p:style>
+        <p:txBody>
+          <a:bodyPr rtlCol="0" anchor="ctr"/>
+          <a:lstStyle/>
+          <a:p>
+            <a:pPr algn="ctr"/>
+            <a:endParaRPr lang="en-US"/>
+          </a:p>
+        </p:txBody>
+      </p:sp>
+      <p:sp>
+        <p:nvSpPr>
+          <p:cNvPr id="24" name="Right Arrow 23"/>
+          <p:cNvSpPr/>
+          <p:nvPr/>
+        </p:nvSpPr>
+        <p:spPr>
+          <a:xfrm>
+            <a:off x="7615002" y="5054183"/>
+            <a:ext cx="1064303" cy="764499"/>
+          </a:xfrm>
+          <a:prstGeom prst="rightArrow">
+            <a:avLst>
+              <a:gd name="adj1" fmla="val 50000"/>
+              <a:gd name="adj2" fmla="val 55714"/>
+            </a:avLst>
+          </a:prstGeom>
+          <a:gradFill flip="none" rotWithShape="1">
+            <a:gsLst>
+              <a:gs pos="0">
+                <a:srgbClr val="FFC000">
+                  <a:tint val="66000"/>
+                  <a:satMod val="160000"/>
+                </a:srgbClr>
+              </a:gs>
+              <a:gs pos="50000">
+                <a:srgbClr val="FFC000">
+                  <a:tint val="44500"/>
+                  <a:satMod val="160000"/>
+                </a:srgbClr>
+              </a:gs>
+              <a:gs pos="100000">
+                <a:srgbClr val="FFC000">
+                  <a:tint val="23500"/>
+                  <a:satMod val="160000"/>
+                </a:srgbClr>
+              </a:gs>
+            </a:gsLst>
+            <a:lin ang="10800000" scaled="1"/>
+            <a:tileRect/>
+          </a:gradFill>
+          <a:ln>
+            <a:noFill/>
+          </a:ln>
+        </p:spPr>
+        <p:style>
+          <a:lnRef idx="2">
+            <a:schemeClr val="accent1">
+              <a:shade val="50000"/>
+            </a:schemeClr>
+          </a:lnRef>
+          <a:fillRef idx="1">
+            <a:schemeClr val="accent1"/>
+          </a:fillRef>
+          <a:effectRef idx="0">
+            <a:schemeClr val="accent1"/>
+          </a:effectRef>
+          <a:fontRef idx="minor">
+            <a:schemeClr val="lt1"/>
+          </a:fontRef>
+        </p:style>
+        <p:txBody>
+          <a:bodyPr rtlCol="0" anchor="ctr"/>
+          <a:lstStyle/>
+          <a:p>
+            <a:pPr algn="ctr"/>
+            <a:endParaRPr lang="en-US"/>
+          </a:p>
+        </p:txBody>
+      </p:sp>
+      <p:sp>
+        <p:nvSpPr>
+          <p:cNvPr id="29" name="TextBox 28"/>
+          <p:cNvSpPr txBox="1"/>
+          <p:nvPr/>
+        </p:nvSpPr>
+        <p:spPr>
+          <a:xfrm>
+            <a:off x="1484025" y="1611445"/>
+            <a:ext cx="881103" cy="461665"/>
+          </a:xfrm>
+          <a:prstGeom prst="rect">
+            <a:avLst/>
+          </a:prstGeom>
+          <a:noFill/>
+        </p:spPr>
+        <p:txBody>
+          <a:bodyPr wrap="square" rtlCol="0">
+            <a:spAutoFit/>
+          </a:bodyPr>
+          <a:lstStyle/>
+          <a:p>
+            <a:r>
+              <a:rPr lang="en-US" sz="2400" dirty="0" err="1">
+                <a:solidFill>
+                  <a:schemeClr val="accent6">
+                    <a:lumMod val="75000"/>
+                  </a:schemeClr>
+                </a:solidFill>
+              </a:rPr>
+              <a:t>Q</a:t>
+            </a:r>
+            <a:r>
+              <a:rPr lang="en-US" sz="2400" baseline="-25000" dirty="0" err="1">
+                <a:solidFill>
+                  <a:schemeClr val="accent6">
+                    <a:lumMod val="75000"/>
+                  </a:schemeClr>
+                </a:solidFill>
+              </a:rPr>
+              <a:t>h</a:t>
+            </a:r>
+            <a:endParaRPr lang="en-US" sz="2400" baseline="-25000" dirty="0">
+              <a:solidFill>
+                <a:schemeClr val="accent6">
+                  <a:lumMod val="75000"/>
+                </a:schemeClr>
+              </a:solidFill>
+            </a:endParaRPr>
+          </a:p>
+        </p:txBody>
+      </p:sp>
+      <p:sp>
+        <p:nvSpPr>
+          <p:cNvPr id="30" name="TextBox 29"/>
+          <p:cNvSpPr txBox="1"/>
+          <p:nvPr/>
+        </p:nvSpPr>
+        <p:spPr>
+          <a:xfrm>
+            <a:off x="7744914" y="5211581"/>
+            <a:ext cx="478016" cy="461665"/>
+          </a:xfrm>
+          <a:prstGeom prst="rect">
+            <a:avLst/>
+          </a:prstGeom>
+          <a:noFill/>
+        </p:spPr>
+        <p:txBody>
+          <a:bodyPr wrap="none" rtlCol="0">
+            <a:spAutoFit/>
+          </a:bodyPr>
+          <a:lstStyle/>
+          <a:p>
+            <a:r>
+              <a:rPr lang="en-US" sz="2400" dirty="0">
+                <a:solidFill>
+                  <a:schemeClr val="accent6">
+                    <a:lumMod val="75000"/>
+                  </a:schemeClr>
+                </a:solidFill>
+              </a:rPr>
+              <a:t>Q</a:t>
+            </a:r>
+            <a:r>
+              <a:rPr lang="en-US" sz="2400" baseline="-25000" dirty="0">
+                <a:solidFill>
+                  <a:schemeClr val="accent6">
+                    <a:lumMod val="75000"/>
+                  </a:schemeClr>
+                </a:solidFill>
+              </a:rPr>
+              <a:t>c</a:t>
+            </a:r>
+          </a:p>
+        </p:txBody>
+      </p:sp>
+      <p:sp>
+        <p:nvSpPr>
+          <p:cNvPr id="31" name="Right Arrow 30"/>
+          <p:cNvSpPr/>
+          <p:nvPr/>
+        </p:nvSpPr>
+        <p:spPr>
+          <a:xfrm>
+            <a:off x="3869957" y="4023607"/>
+            <a:ext cx="2440900" cy="764499"/>
+          </a:xfrm>
+          <a:prstGeom prst="rightArrow">
+            <a:avLst>
+              <a:gd name="adj1" fmla="val 50000"/>
+              <a:gd name="adj2" fmla="val 55714"/>
+            </a:avLst>
+          </a:prstGeom>
+          <a:gradFill flip="none" rotWithShape="1">
+            <a:gsLst>
+              <a:gs pos="0">
+                <a:schemeClr val="accent3">
+                  <a:lumMod val="75000"/>
+                  <a:tint val="66000"/>
+                  <a:satMod val="160000"/>
+                </a:schemeClr>
+              </a:gs>
+              <a:gs pos="50000">
+                <a:schemeClr val="accent3">
+                  <a:lumMod val="75000"/>
+                  <a:tint val="44500"/>
+                  <a:satMod val="160000"/>
+                </a:schemeClr>
+              </a:gs>
+              <a:gs pos="100000">
+                <a:schemeClr val="accent3">
+                  <a:lumMod val="75000"/>
+                  <a:tint val="23500"/>
+                  <a:satMod val="160000"/>
+                </a:schemeClr>
+              </a:gs>
+            </a:gsLst>
+            <a:lin ang="10800000" scaled="1"/>
+            <a:tileRect/>
+          </a:gradFill>
+          <a:ln>
+            <a:noFill/>
+          </a:ln>
+        </p:spPr>
+        <p:style>
+          <a:lnRef idx="2">
+            <a:schemeClr val="accent1">
+              <a:shade val="50000"/>
+            </a:schemeClr>
+          </a:lnRef>
+          <a:fillRef idx="1">
+            <a:schemeClr val="accent1"/>
+          </a:fillRef>
+          <a:effectRef idx="0">
+            <a:schemeClr val="accent1"/>
+          </a:effectRef>
+          <a:fontRef idx="minor">
+            <a:schemeClr val="lt1"/>
+          </a:fontRef>
+        </p:style>
+        <p:txBody>
+          <a:bodyPr rtlCol="0" anchor="ctr"/>
+          <a:lstStyle/>
+          <a:p>
+            <a:pPr algn="ctr"/>
+            <a:endParaRPr lang="en-US"/>
+          </a:p>
+        </p:txBody>
+      </p:sp>
+      <p:sp>
+        <p:nvSpPr>
+          <p:cNvPr id="32" name="Right Arrow 31"/>
+          <p:cNvSpPr/>
+          <p:nvPr/>
+        </p:nvSpPr>
+        <p:spPr>
+          <a:xfrm>
+            <a:off x="704537" y="4023607"/>
+            <a:ext cx="2208550" cy="764499"/>
+          </a:xfrm>
+          <a:prstGeom prst="rightArrow">
+            <a:avLst>
+              <a:gd name="adj1" fmla="val 50000"/>
+              <a:gd name="adj2" fmla="val 55714"/>
+            </a:avLst>
+          </a:prstGeom>
+          <a:gradFill flip="none" rotWithShape="1">
+            <a:gsLst>
+              <a:gs pos="0">
+                <a:schemeClr val="accent3">
+                  <a:lumMod val="75000"/>
+                  <a:tint val="66000"/>
+                  <a:satMod val="160000"/>
+                </a:schemeClr>
+              </a:gs>
+              <a:gs pos="50000">
+                <a:schemeClr val="accent3">
+                  <a:lumMod val="75000"/>
+                  <a:tint val="44500"/>
+                  <a:satMod val="160000"/>
+                </a:schemeClr>
+              </a:gs>
+              <a:gs pos="100000">
+                <a:schemeClr val="accent3">
+                  <a:lumMod val="75000"/>
+                  <a:tint val="23500"/>
+                  <a:satMod val="160000"/>
+                </a:schemeClr>
+              </a:gs>
+            </a:gsLst>
+            <a:lin ang="10800000" scaled="1"/>
+            <a:tileRect/>
+          </a:gradFill>
+          <a:ln>
+            <a:noFill/>
+          </a:ln>
+        </p:spPr>
+        <p:style>
+          <a:lnRef idx="2">
+            <a:schemeClr val="accent1">
+              <a:shade val="50000"/>
+            </a:schemeClr>
+          </a:lnRef>
+          <a:fillRef idx="1">
+            <a:schemeClr val="accent1"/>
+          </a:fillRef>
+          <a:effectRef idx="0">
+            <a:schemeClr val="accent1"/>
+          </a:effectRef>
+          <a:fontRef idx="minor">
+            <a:schemeClr val="lt1"/>
+          </a:fontRef>
+        </p:style>
+        <p:txBody>
+          <a:bodyPr rtlCol="0" anchor="ctr"/>
+          <a:lstStyle/>
+          <a:p>
+            <a:pPr algn="ctr"/>
+            <a:endParaRPr lang="en-US"/>
+          </a:p>
+        </p:txBody>
+      </p:sp>
+      <p:sp>
+        <p:nvSpPr>
+          <p:cNvPr id="33" name="TextBox 32"/>
+          <p:cNvSpPr txBox="1"/>
+          <p:nvPr/>
+        </p:nvSpPr>
+        <p:spPr>
+          <a:xfrm>
+            <a:off x="642073" y="4175024"/>
+            <a:ext cx="2052228" cy="461665"/>
+          </a:xfrm>
+          <a:prstGeom prst="rect">
+            <a:avLst/>
+          </a:prstGeom>
+          <a:noFill/>
+        </p:spPr>
+        <p:txBody>
+          <a:bodyPr wrap="none" rtlCol="0">
+            <a:spAutoFit/>
+          </a:bodyPr>
+          <a:lstStyle/>
+          <a:p>
+            <a:r>
+              <a:rPr lang="en-US" sz="2400" dirty="0">
+                <a:solidFill>
+                  <a:schemeClr val="accent3">
+                    <a:lumMod val="50000"/>
+                  </a:schemeClr>
+                </a:solidFill>
+              </a:rPr>
+              <a:t>Work Required</a:t>
+            </a:r>
+            <a:endParaRPr lang="en-US" sz="2400" baseline="-25000" dirty="0">
+              <a:solidFill>
+                <a:schemeClr val="accent3">
+                  <a:lumMod val="50000"/>
+                </a:schemeClr>
+              </a:solidFill>
+            </a:endParaRPr>
+          </a:p>
+        </p:txBody>
+      </p:sp>
+      <p:sp>
+        <p:nvSpPr>
+          <p:cNvPr id="34" name="TextBox 33"/>
+          <p:cNvSpPr txBox="1"/>
+          <p:nvPr/>
+        </p:nvSpPr>
+        <p:spPr>
+          <a:xfrm>
+            <a:off x="3852468" y="4175024"/>
+            <a:ext cx="2256130" cy="461665"/>
+          </a:xfrm>
+          <a:prstGeom prst="rect">
+            <a:avLst/>
+          </a:prstGeom>
+          <a:noFill/>
+        </p:spPr>
+        <p:txBody>
+          <a:bodyPr wrap="none" rtlCol="0">
+            <a:spAutoFit/>
+          </a:bodyPr>
+          <a:lstStyle/>
+          <a:p>
+            <a:r>
+              <a:rPr lang="en-US" sz="2400" dirty="0">
+                <a:solidFill>
+                  <a:schemeClr val="accent3">
+                    <a:lumMod val="50000"/>
+                  </a:schemeClr>
+                </a:solidFill>
+              </a:rPr>
+              <a:t>Useful Work Out</a:t>
+            </a:r>
+            <a:endParaRPr lang="en-US" sz="2400" baseline="-25000" dirty="0">
+              <a:solidFill>
+                <a:schemeClr val="accent3">
+                  <a:lumMod val="50000"/>
+                </a:schemeClr>
+              </a:solidFill>
+            </a:endParaRPr>
+          </a:p>
+        </p:txBody>
+      </p:sp>
+    </p:spTree>
+  </p:cSld>
+  <p:clrMapOvr>
+    <a:masterClrMapping/>
+  </p:clrMapOvr>
+</p:sld>
+</file>
+
+<file path=ppt/slides/slide12.xml><?xml version="1.0" encoding="utf-8"?>
 <p:sld xmlns:a="http://schemas.openxmlformats.org/drawingml/2006/main" xmlns:r="http://schemas.openxmlformats.org/officeDocument/2006/relationships" xmlns:p="http://schemas.openxmlformats.org/presentationml/2006/main">
   <p:cSld>
     <p:spTree>
@@ -3606,7 +5162,7 @@
 </p:sld>
 </file>
 
-<file path=ppt/slides/slide11.xml><?xml version="1.0" encoding="utf-8"?>
+<file path=ppt/slides/slide13.xml><?xml version="1.0" encoding="utf-8"?>
 <p:sld xmlns:a="http://schemas.openxmlformats.org/drawingml/2006/main" xmlns:r="http://schemas.openxmlformats.org/officeDocument/2006/relationships" xmlns:p="http://schemas.openxmlformats.org/presentationml/2006/main">
   <p:cSld>
     <p:spTree>
@@ -3957,7 +5513,7 @@
 </p:sld>
 </file>
 
-<file path=ppt/slides/slide12.xml><?xml version="1.0" encoding="utf-8"?>
+<file path=ppt/slides/slide14.xml><?xml version="1.0" encoding="utf-8"?>
 <p:sld xmlns:a="http://schemas.openxmlformats.org/drawingml/2006/main" xmlns:r="http://schemas.openxmlformats.org/officeDocument/2006/relationships" xmlns:p="http://schemas.openxmlformats.org/presentationml/2006/main">
   <p:cSld>
     <p:spTree>
@@ -4327,6 +5883,213 @@
           <a:chExt cx="0" cy="0"/>
         </a:xfrm>
       </p:grpSpPr>
+      <p:sp>
+        <p:nvSpPr>
+          <p:cNvPr id="4" name="Title 3">
+            <a:extLst>
+              <a:ext uri="{FF2B5EF4-FFF2-40B4-BE49-F238E27FC236}">
+                <a16:creationId xmlns:a16="http://schemas.microsoft.com/office/drawing/2014/main" id="{57EFC4A7-431A-16C7-9639-284FFE935132}"/>
+              </a:ext>
+            </a:extLst>
+          </p:cNvPr>
+          <p:cNvSpPr>
+            <a:spLocks noGrp="1"/>
+          </p:cNvSpPr>
+          <p:nvPr>
+            <p:ph type="ctrTitle"/>
+          </p:nvPr>
+        </p:nvSpPr>
+        <p:spPr/>
+        <p:txBody>
+          <a:bodyPr/>
+          <a:lstStyle/>
+          <a:p>
+            <a:r>
+              <a:rPr lang="en-US"/>
+              <a:t>End</a:t>
+            </a:r>
+          </a:p>
+        </p:txBody>
+      </p:sp>
+      <p:sp>
+        <p:nvSpPr>
+          <p:cNvPr id="5" name="Subtitle 4">
+            <a:extLst>
+              <a:ext uri="{FF2B5EF4-FFF2-40B4-BE49-F238E27FC236}">
+                <a16:creationId xmlns:a16="http://schemas.microsoft.com/office/drawing/2014/main" id="{E295DEED-18B7-D6FE-E17D-CE0E06A11EA7}"/>
+              </a:ext>
+            </a:extLst>
+          </p:cNvPr>
+          <p:cNvSpPr>
+            <a:spLocks noGrp="1"/>
+          </p:cNvSpPr>
+          <p:nvPr>
+            <p:ph type="subTitle" idx="1"/>
+          </p:nvPr>
+        </p:nvSpPr>
+        <p:spPr/>
+        <p:txBody>
+          <a:bodyPr/>
+          <a:lstStyle/>
+          <a:p>
+            <a:endParaRPr lang="en-US"/>
+          </a:p>
+        </p:txBody>
+      </p:sp>
+    </p:spTree>
+    <p:extLst>
+      <p:ext uri="{BB962C8B-B14F-4D97-AF65-F5344CB8AC3E}">
+        <p14:creationId xmlns:p14="http://schemas.microsoft.com/office/powerpoint/2010/main" val="684432333"/>
+      </p:ext>
+    </p:extLst>
+  </p:cSld>
+  <p:clrMapOvr>
+    <a:masterClrMapping/>
+  </p:clrMapOvr>
+</p:sld>
+</file>
+
+<file path=ppt/slides/slide3.xml><?xml version="1.0" encoding="utf-8"?>
+<p:sld xmlns:a="http://schemas.openxmlformats.org/drawingml/2006/main" xmlns:r="http://schemas.openxmlformats.org/officeDocument/2006/relationships" xmlns:p="http://schemas.openxmlformats.org/presentationml/2006/main">
+  <p:cSld>
+    <p:spTree>
+      <p:nvGrpSpPr>
+        <p:cNvPr id="1" name=""/>
+        <p:cNvGrpSpPr/>
+        <p:nvPr/>
+      </p:nvGrpSpPr>
+      <p:grpSpPr>
+        <a:xfrm>
+          <a:off x="0" y="0"/>
+          <a:ext cx="0" cy="0"/>
+          <a:chOff x="0" y="0"/>
+          <a:chExt cx="0" cy="0"/>
+        </a:xfrm>
+      </p:grpSpPr>
+      <p:sp>
+        <p:nvSpPr>
+          <p:cNvPr id="2" name="Title 1"/>
+          <p:cNvSpPr>
+            <a:spLocks noGrp="1"/>
+          </p:cNvSpPr>
+          <p:nvPr>
+            <p:ph type="ctrTitle"/>
+          </p:nvPr>
+        </p:nvSpPr>
+        <p:spPr/>
+        <p:txBody>
+          <a:bodyPr/>
+          <a:lstStyle/>
+          <a:p>
+            <a:endParaRPr lang="en-US"/>
+          </a:p>
+        </p:txBody>
+      </p:sp>
+      <p:sp>
+        <p:nvSpPr>
+          <p:cNvPr id="3" name="Subtitle 2"/>
+          <p:cNvSpPr>
+            <a:spLocks noGrp="1"/>
+          </p:cNvSpPr>
+          <p:nvPr>
+            <p:ph type="subTitle" idx="1"/>
+          </p:nvPr>
+        </p:nvSpPr>
+        <p:spPr/>
+        <p:txBody>
+          <a:bodyPr/>
+          <a:lstStyle/>
+          <a:p>
+            <a:endParaRPr lang="en-US"/>
+          </a:p>
+        </p:txBody>
+      </p:sp>
+      <p:pic>
+        <p:nvPicPr>
+          <p:cNvPr id="1026" name="Picture 2"/>
+          <p:cNvPicPr>
+            <a:picLocks noChangeAspect="1" noChangeArrowheads="1"/>
+          </p:cNvPicPr>
+          <p:nvPr/>
+        </p:nvPicPr>
+        <p:blipFill>
+          <a:blip r:embed="rId2" cstate="print"/>
+          <a:srcRect/>
+          <a:stretch>
+            <a:fillRect/>
+          </a:stretch>
+        </p:blipFill>
+        <p:spPr bwMode="auto">
+          <a:xfrm>
+            <a:off x="2405183" y="0"/>
+            <a:ext cx="4080562" cy="5778864"/>
+          </a:xfrm>
+          <a:prstGeom prst="rect">
+            <a:avLst/>
+          </a:prstGeom>
+          <a:noFill/>
+          <a:ln w="9525">
+            <a:noFill/>
+            <a:miter lim="800000"/>
+            <a:headEnd/>
+            <a:tailEnd/>
+          </a:ln>
+        </p:spPr>
+      </p:pic>
+      <p:sp>
+        <p:nvSpPr>
+          <p:cNvPr id="5" name="Rectangle 4"/>
+          <p:cNvSpPr/>
+          <p:nvPr/>
+        </p:nvSpPr>
+        <p:spPr>
+          <a:xfrm>
+            <a:off x="2241029" y="6013927"/>
+            <a:ext cx="4572000" cy="646331"/>
+          </a:xfrm>
+          <a:prstGeom prst="rect">
+            <a:avLst/>
+          </a:prstGeom>
+        </p:spPr>
+        <p:txBody>
+          <a:bodyPr>
+            <a:spAutoFit/>
+          </a:bodyPr>
+          <a:lstStyle/>
+          <a:p>
+            <a:r>
+              <a:rPr lang="en-US" i="1" dirty="0"/>
+              <a:t>Manual of Driving and Maintenance for Mechanical Vehicles (Wheeled)</a:t>
+            </a:r>
+            <a:endParaRPr lang="en-US" dirty="0"/>
+          </a:p>
+        </p:txBody>
+      </p:sp>
+    </p:spTree>
+  </p:cSld>
+  <p:clrMapOvr>
+    <a:masterClrMapping/>
+  </p:clrMapOvr>
+</p:sld>
+</file>
+
+<file path=ppt/slides/slide4.xml><?xml version="1.0" encoding="utf-8"?>
+<p:sld xmlns:a="http://schemas.openxmlformats.org/drawingml/2006/main" xmlns:r="http://schemas.openxmlformats.org/officeDocument/2006/relationships" xmlns:p="http://schemas.openxmlformats.org/presentationml/2006/main">
+  <p:cSld>
+    <p:spTree>
+      <p:nvGrpSpPr>
+        <p:cNvPr id="1" name=""/>
+        <p:cNvGrpSpPr/>
+        <p:nvPr/>
+      </p:nvGrpSpPr>
+      <p:grpSpPr>
+        <a:xfrm>
+          <a:off x="0" y="0"/>
+          <a:ext cx="0" cy="0"/>
+          <a:chOff x="0" y="0"/>
+          <a:chExt cx="0" cy="0"/>
+        </a:xfrm>
+      </p:grpSpPr>
       <p:pic>
         <p:nvPicPr>
           <p:cNvPr id="4098" name="Picture 2"/>
@@ -4928,7 +6691,7 @@
 </p:sld>
 </file>
 
-<file path=ppt/slides/slide3.xml><?xml version="1.0" encoding="utf-8"?>
+<file path=ppt/slides/slide5.xml><?xml version="1.0" encoding="utf-8"?>
 <p:sld xmlns:a="http://schemas.openxmlformats.org/drawingml/2006/main" xmlns:r="http://schemas.openxmlformats.org/officeDocument/2006/relationships" xmlns:p="http://schemas.openxmlformats.org/presentationml/2006/main">
   <p:cSld>
     <p:spTree>
@@ -5284,7 +7047,7 @@
 </p:sld>
 </file>
 
-<file path=ppt/slides/slide4.xml><?xml version="1.0" encoding="utf-8"?>
+<file path=ppt/slides/slide6.xml><?xml version="1.0" encoding="utf-8"?>
 <p:sld xmlns:a="http://schemas.openxmlformats.org/drawingml/2006/main" xmlns:r="http://schemas.openxmlformats.org/officeDocument/2006/relationships" xmlns:p="http://schemas.openxmlformats.org/presentationml/2006/main">
   <p:cSld>
     <p:spTree>
@@ -5602,7 +7365,7 @@
 </p:sld>
 </file>
 
-<file path=ppt/slides/slide5.xml><?xml version="1.0" encoding="utf-8"?>
+<file path=ppt/slides/slide7.xml><?xml version="1.0" encoding="utf-8"?>
 <p:sld xmlns:a="http://schemas.openxmlformats.org/drawingml/2006/main" xmlns:r="http://schemas.openxmlformats.org/officeDocument/2006/relationships" xmlns:p="http://schemas.openxmlformats.org/presentationml/2006/main">
   <p:cSld>
     <p:spTree>
@@ -5956,7 +7719,7 @@
 </p:sld>
 </file>
 
-<file path=ppt/slides/slide6.xml><?xml version="1.0" encoding="utf-8"?>
+<file path=ppt/slides/slide8.xml><?xml version="1.0" encoding="utf-8"?>
 <p:sld xmlns:a="http://schemas.openxmlformats.org/drawingml/2006/main" xmlns:r="http://schemas.openxmlformats.org/officeDocument/2006/relationships" xmlns:p="http://schemas.openxmlformats.org/presentationml/2006/main">
   <p:cSld>
     <p:spTree>
@@ -6340,7 +8103,7 @@
 </p:sld>
 </file>
 
-<file path=ppt/slides/slide7.xml><?xml version="1.0" encoding="utf-8"?>
+<file path=ppt/slides/slide9.xml><?xml version="1.0" encoding="utf-8"?>
 <p:sld xmlns:a="http://schemas.openxmlformats.org/drawingml/2006/main" xmlns:r="http://schemas.openxmlformats.org/officeDocument/2006/relationships" xmlns:p="http://schemas.openxmlformats.org/presentationml/2006/main">
   <p:cSld>
     <p:spTree>
@@ -6743,1570 +8506,6 @@
               <a:rPr lang="en-US" sz="4000" dirty="0"/>
               <a:t>Process AI</a:t>
             </a:r>
-          </a:p>
-        </p:txBody>
-      </p:sp>
-    </p:spTree>
-  </p:cSld>
-  <p:clrMapOvr>
-    <a:masterClrMapping/>
-  </p:clrMapOvr>
-</p:sld>
-</file>
-
-<file path=ppt/slides/slide8.xml><?xml version="1.0" encoding="utf-8"?>
-<p:sld xmlns:a="http://schemas.openxmlformats.org/drawingml/2006/main" xmlns:r="http://schemas.openxmlformats.org/officeDocument/2006/relationships" xmlns:p="http://schemas.openxmlformats.org/presentationml/2006/main">
-  <p:cSld>
-    <p:spTree>
-      <p:nvGrpSpPr>
-        <p:cNvPr id="1" name=""/>
-        <p:cNvGrpSpPr/>
-        <p:nvPr/>
-      </p:nvGrpSpPr>
-      <p:grpSpPr>
-        <a:xfrm>
-          <a:off x="0" y="0"/>
-          <a:ext cx="0" cy="0"/>
-          <a:chOff x="0" y="0"/>
-          <a:chExt cx="0" cy="0"/>
-        </a:xfrm>
-      </p:grpSpPr>
-      <p:pic>
-        <p:nvPicPr>
-          <p:cNvPr id="2" name="Picture 2"/>
-          <p:cNvPicPr>
-            <a:picLocks noChangeAspect="1" noChangeArrowheads="1"/>
-          </p:cNvPicPr>
-          <p:nvPr/>
-        </p:nvPicPr>
-        <p:blipFill>
-          <a:blip r:embed="rId2" cstate="print"/>
-          <a:srcRect r="52471" b="55168"/>
-          <a:stretch>
-            <a:fillRect/>
-          </a:stretch>
-        </p:blipFill>
-        <p:spPr bwMode="auto">
-          <a:xfrm>
-            <a:off x="1556990" y="781986"/>
-            <a:ext cx="4337892" cy="5794693"/>
-          </a:xfrm>
-          <a:prstGeom prst="rect">
-            <a:avLst/>
-          </a:prstGeom>
-          <a:noFill/>
-          <a:ln w="9525">
-            <a:noFill/>
-            <a:miter lim="800000"/>
-            <a:headEnd/>
-            <a:tailEnd/>
-          </a:ln>
-        </p:spPr>
-      </p:pic>
-      <p:sp>
-        <p:nvSpPr>
-          <p:cNvPr id="7" name="TextBox 6"/>
-          <p:cNvSpPr txBox="1"/>
-          <p:nvPr/>
-        </p:nvSpPr>
-        <p:spPr>
-          <a:xfrm>
-            <a:off x="-26981" y="2127855"/>
-            <a:ext cx="1125010" cy="1384995"/>
-          </a:xfrm>
-          <a:prstGeom prst="rect">
-            <a:avLst/>
-          </a:prstGeom>
-          <a:noFill/>
-        </p:spPr>
-        <p:txBody>
-          <a:bodyPr wrap="square" rtlCol="0">
-            <a:spAutoFit/>
-          </a:bodyPr>
-          <a:lstStyle/>
-          <a:p>
-            <a:r>
-              <a:rPr lang="en-US" sz="2800" dirty="0"/>
-              <a:t>Intake valve opens</a:t>
-            </a:r>
-          </a:p>
-        </p:txBody>
-      </p:sp>
-      <p:sp>
-        <p:nvSpPr>
-          <p:cNvPr id="8" name="Arc 7"/>
-          <p:cNvSpPr/>
-          <p:nvPr/>
-        </p:nvSpPr>
-        <p:spPr>
-          <a:xfrm>
-            <a:off x="3001779" y="4137285"/>
-            <a:ext cx="2068643" cy="2383436"/>
-          </a:xfrm>
-          <a:prstGeom prst="arc">
-            <a:avLst>
-              <a:gd name="adj1" fmla="val 21573557"/>
-              <a:gd name="adj2" fmla="val 5439512"/>
-            </a:avLst>
-          </a:prstGeom>
-          <a:ln>
-            <a:solidFill>
-              <a:srgbClr val="FF0000"/>
-            </a:solidFill>
-            <a:headEnd type="none" w="med" len="med"/>
-            <a:tailEnd type="triangle" w="lg" len="lg"/>
-          </a:ln>
-        </p:spPr>
-        <p:style>
-          <a:lnRef idx="1">
-            <a:schemeClr val="accent1"/>
-          </a:lnRef>
-          <a:fillRef idx="0">
-            <a:schemeClr val="accent1"/>
-          </a:fillRef>
-          <a:effectRef idx="0">
-            <a:schemeClr val="accent1"/>
-          </a:effectRef>
-          <a:fontRef idx="minor">
-            <a:schemeClr val="tx1"/>
-          </a:fontRef>
-        </p:style>
-        <p:txBody>
-          <a:bodyPr rtlCol="0" anchor="ctr"/>
-          <a:lstStyle/>
-          <a:p>
-            <a:pPr algn="ctr"/>
-            <a:endParaRPr lang="en-US"/>
-          </a:p>
-        </p:txBody>
-      </p:sp>
-      <p:sp>
-        <p:nvSpPr>
-          <p:cNvPr id="11" name="Freeform 10"/>
-          <p:cNvSpPr/>
-          <p:nvPr/>
-        </p:nvSpPr>
-        <p:spPr>
-          <a:xfrm>
-            <a:off x="1262921" y="1858780"/>
-            <a:ext cx="1259174" cy="884420"/>
-          </a:xfrm>
-          <a:custGeom>
-            <a:avLst/>
-            <a:gdLst>
-              <a:gd name="connsiteX0" fmla="*/ 1259174 w 1259174"/>
-              <a:gd name="connsiteY0" fmla="*/ 0 h 884420"/>
-              <a:gd name="connsiteX1" fmla="*/ 794479 w 1259174"/>
-              <a:gd name="connsiteY1" fmla="*/ 284813 h 884420"/>
-              <a:gd name="connsiteX2" fmla="*/ 914400 w 1259174"/>
-              <a:gd name="connsiteY2" fmla="*/ 299803 h 884420"/>
-              <a:gd name="connsiteX3" fmla="*/ 0 w 1259174"/>
-              <a:gd name="connsiteY3" fmla="*/ 884420 h 884420"/>
-            </a:gdLst>
-            <a:ahLst/>
-            <a:cxnLst>
-              <a:cxn ang="0">
-                <a:pos x="connsiteX0" y="connsiteY0"/>
-              </a:cxn>
-              <a:cxn ang="0">
-                <a:pos x="connsiteX1" y="connsiteY1"/>
-              </a:cxn>
-              <a:cxn ang="0">
-                <a:pos x="connsiteX2" y="connsiteY2"/>
-              </a:cxn>
-              <a:cxn ang="0">
-                <a:pos x="connsiteX3" y="connsiteY3"/>
-              </a:cxn>
-            </a:cxnLst>
-            <a:rect l="l" t="t" r="r" b="b"/>
-            <a:pathLst>
-              <a:path w="1259174" h="884420">
-                <a:moveTo>
-                  <a:pt x="1259174" y="0"/>
-                </a:moveTo>
-                <a:cubicBezTo>
-                  <a:pt x="1055557" y="117423"/>
-                  <a:pt x="851941" y="234846"/>
-                  <a:pt x="794479" y="284813"/>
-                </a:cubicBezTo>
-                <a:cubicBezTo>
-                  <a:pt x="737017" y="334780"/>
-                  <a:pt x="1046813" y="199869"/>
-                  <a:pt x="914400" y="299803"/>
-                </a:cubicBezTo>
-                <a:cubicBezTo>
-                  <a:pt x="781987" y="399738"/>
-                  <a:pt x="154898" y="791981"/>
-                  <a:pt x="0" y="884420"/>
-                </a:cubicBezTo>
-              </a:path>
-            </a:pathLst>
-          </a:custGeom>
-          <a:ln w="28575">
-            <a:solidFill>
-              <a:srgbClr val="FFC000"/>
-            </a:solidFill>
-            <a:headEnd type="triangle" w="med" len="med"/>
-            <a:tailEnd type="none" w="med" len="med"/>
-          </a:ln>
-        </p:spPr>
-        <p:style>
-          <a:lnRef idx="1">
-            <a:schemeClr val="accent1"/>
-          </a:lnRef>
-          <a:fillRef idx="0">
-            <a:schemeClr val="accent1"/>
-          </a:fillRef>
-          <a:effectRef idx="0">
-            <a:schemeClr val="accent1"/>
-          </a:effectRef>
-          <a:fontRef idx="minor">
-            <a:schemeClr val="tx1"/>
-          </a:fontRef>
-        </p:style>
-        <p:txBody>
-          <a:bodyPr rtlCol="0" anchor="ctr"/>
-          <a:lstStyle/>
-          <a:p>
-            <a:pPr algn="ctr"/>
-            <a:endParaRPr lang="en-US"/>
-          </a:p>
-        </p:txBody>
-      </p:sp>
-      <p:cxnSp>
-        <p:nvCxnSpPr>
-          <p:cNvPr id="13" name="Straight Arrow Connector 12"/>
-          <p:cNvCxnSpPr/>
-          <p:nvPr/>
-        </p:nvCxnSpPr>
-        <p:spPr>
-          <a:xfrm>
-            <a:off x="3616376" y="2863121"/>
-            <a:ext cx="0" cy="464695"/>
-          </a:xfrm>
-          <a:prstGeom prst="straightConnector1">
-            <a:avLst/>
-          </a:prstGeom>
-          <a:ln w="28575">
-            <a:solidFill>
-              <a:srgbClr val="FF0000"/>
-            </a:solidFill>
-            <a:tailEnd type="arrow"/>
-          </a:ln>
-        </p:spPr>
-        <p:style>
-          <a:lnRef idx="1">
-            <a:schemeClr val="accent1"/>
-          </a:lnRef>
-          <a:fillRef idx="0">
-            <a:schemeClr val="accent1"/>
-          </a:fillRef>
-          <a:effectRef idx="0">
-            <a:schemeClr val="accent1"/>
-          </a:effectRef>
-          <a:fontRef idx="minor">
-            <a:schemeClr val="tx1"/>
-          </a:fontRef>
-        </p:style>
-      </p:cxnSp>
-      <p:sp>
-        <p:nvSpPr>
-          <p:cNvPr id="14" name="TextBox 13"/>
-          <p:cNvSpPr txBox="1"/>
-          <p:nvPr/>
-        </p:nvSpPr>
-        <p:spPr>
-          <a:xfrm>
-            <a:off x="635083" y="4273947"/>
-            <a:ext cx="1302395" cy="954107"/>
-          </a:xfrm>
-          <a:prstGeom prst="rect">
-            <a:avLst/>
-          </a:prstGeom>
-          <a:noFill/>
-        </p:spPr>
-        <p:txBody>
-          <a:bodyPr wrap="square" rtlCol="0">
-            <a:spAutoFit/>
-          </a:bodyPr>
-          <a:lstStyle/>
-          <a:p>
-            <a:r>
-              <a:rPr lang="en-US" sz="2800" dirty="0"/>
-              <a:t>Piston Lowers</a:t>
-            </a:r>
-          </a:p>
-        </p:txBody>
-      </p:sp>
-      <p:sp>
-        <p:nvSpPr>
-          <p:cNvPr id="15" name="Freeform 14"/>
-          <p:cNvSpPr/>
-          <p:nvPr/>
-        </p:nvSpPr>
-        <p:spPr>
-          <a:xfrm>
-            <a:off x="1802567" y="3285343"/>
-            <a:ext cx="1666406" cy="1346617"/>
-          </a:xfrm>
-          <a:custGeom>
-            <a:avLst/>
-            <a:gdLst>
-              <a:gd name="connsiteX0" fmla="*/ 1259174 w 1259174"/>
-              <a:gd name="connsiteY0" fmla="*/ 0 h 884420"/>
-              <a:gd name="connsiteX1" fmla="*/ 794479 w 1259174"/>
-              <a:gd name="connsiteY1" fmla="*/ 284813 h 884420"/>
-              <a:gd name="connsiteX2" fmla="*/ 914400 w 1259174"/>
-              <a:gd name="connsiteY2" fmla="*/ 299803 h 884420"/>
-              <a:gd name="connsiteX3" fmla="*/ 0 w 1259174"/>
-              <a:gd name="connsiteY3" fmla="*/ 884420 h 884420"/>
-            </a:gdLst>
-            <a:ahLst/>
-            <a:cxnLst>
-              <a:cxn ang="0">
-                <a:pos x="connsiteX0" y="connsiteY0"/>
-              </a:cxn>
-              <a:cxn ang="0">
-                <a:pos x="connsiteX1" y="connsiteY1"/>
-              </a:cxn>
-              <a:cxn ang="0">
-                <a:pos x="connsiteX2" y="connsiteY2"/>
-              </a:cxn>
-              <a:cxn ang="0">
-                <a:pos x="connsiteX3" y="connsiteY3"/>
-              </a:cxn>
-            </a:cxnLst>
-            <a:rect l="l" t="t" r="r" b="b"/>
-            <a:pathLst>
-              <a:path w="1259174" h="884420">
-                <a:moveTo>
-                  <a:pt x="1259174" y="0"/>
-                </a:moveTo>
-                <a:cubicBezTo>
-                  <a:pt x="1055557" y="117423"/>
-                  <a:pt x="851941" y="234846"/>
-                  <a:pt x="794479" y="284813"/>
-                </a:cubicBezTo>
-                <a:cubicBezTo>
-                  <a:pt x="737017" y="334780"/>
-                  <a:pt x="1046813" y="199869"/>
-                  <a:pt x="914400" y="299803"/>
-                </a:cubicBezTo>
-                <a:cubicBezTo>
-                  <a:pt x="781987" y="399738"/>
-                  <a:pt x="154898" y="791981"/>
-                  <a:pt x="0" y="884420"/>
-                </a:cubicBezTo>
-              </a:path>
-            </a:pathLst>
-          </a:custGeom>
-          <a:ln w="28575">
-            <a:solidFill>
-              <a:srgbClr val="FFC000"/>
-            </a:solidFill>
-            <a:headEnd type="triangle" w="med" len="med"/>
-            <a:tailEnd type="none" w="med" len="med"/>
-          </a:ln>
-        </p:spPr>
-        <p:style>
-          <a:lnRef idx="1">
-            <a:schemeClr val="accent1"/>
-          </a:lnRef>
-          <a:fillRef idx="0">
-            <a:schemeClr val="accent1"/>
-          </a:fillRef>
-          <a:effectRef idx="0">
-            <a:schemeClr val="accent1"/>
-          </a:effectRef>
-          <a:fontRef idx="minor">
-            <a:schemeClr val="tx1"/>
-          </a:fontRef>
-        </p:style>
-        <p:txBody>
-          <a:bodyPr rtlCol="0" anchor="ctr"/>
-          <a:lstStyle/>
-          <a:p>
-            <a:pPr algn="ctr"/>
-            <a:endParaRPr lang="en-US"/>
-          </a:p>
-        </p:txBody>
-      </p:sp>
-      <p:sp>
-        <p:nvSpPr>
-          <p:cNvPr id="16" name="TextBox 15"/>
-          <p:cNvSpPr txBox="1"/>
-          <p:nvPr/>
-        </p:nvSpPr>
-        <p:spPr>
-          <a:xfrm>
-            <a:off x="2477125" y="224104"/>
-            <a:ext cx="2698230" cy="707886"/>
-          </a:xfrm>
-          <a:prstGeom prst="rect">
-            <a:avLst/>
-          </a:prstGeom>
-          <a:noFill/>
-        </p:spPr>
-        <p:txBody>
-          <a:bodyPr wrap="square" rtlCol="0">
-            <a:spAutoFit/>
-          </a:bodyPr>
-          <a:lstStyle/>
-          <a:p>
-            <a:r>
-              <a:rPr lang="en-US" sz="4000" dirty="0"/>
-              <a:t>Process IA</a:t>
-            </a:r>
-          </a:p>
-        </p:txBody>
-      </p:sp>
-      <p:pic>
-        <p:nvPicPr>
-          <p:cNvPr id="10" name="Picture 5"/>
-          <p:cNvPicPr>
-            <a:picLocks noChangeAspect="1" noChangeArrowheads="1"/>
-          </p:cNvPicPr>
-          <p:nvPr/>
-        </p:nvPicPr>
-        <p:blipFill>
-          <a:blip r:embed="rId3" cstate="print">
-            <a:extLst>
-              <a:ext uri="{28A0092B-C50C-407E-A947-70E740481C1C}">
-                <a14:useLocalDpi xmlns:a14="http://schemas.microsoft.com/office/drawing/2010/main" val="0"/>
-              </a:ext>
-            </a:extLst>
-          </a:blip>
-          <a:srcRect/>
-          <a:stretch>
-            <a:fillRect/>
-          </a:stretch>
-        </p:blipFill>
-        <p:spPr bwMode="auto">
-          <a:xfrm>
-            <a:off x="6034582" y="1845897"/>
-            <a:ext cx="2969718" cy="2599103"/>
-          </a:xfrm>
-          <a:prstGeom prst="rect">
-            <a:avLst/>
-          </a:prstGeom>
-          <a:noFill/>
-          <a:ln>
-            <a:noFill/>
-          </a:ln>
-          <a:effectLst/>
-          <a:extLst>
-            <a:ext uri="{909E8E84-426E-40DD-AFC4-6F175D3DCCD1}">
-              <a14:hiddenFill xmlns:a14="http://schemas.microsoft.com/office/drawing/2010/main">
-                <a:solidFill>
-                  <a:schemeClr val="accent1"/>
-                </a:solidFill>
-              </a14:hiddenFill>
-            </a:ext>
-            <a:ext uri="{91240B29-F687-4F45-9708-019B960494DF}">
-              <a14:hiddenLine xmlns:a14="http://schemas.microsoft.com/office/drawing/2010/main" w="9525">
-                <a:solidFill>
-                  <a:schemeClr val="tx1"/>
-                </a:solidFill>
-                <a:miter lim="800000"/>
-                <a:headEnd/>
-                <a:tailEnd/>
-              </a14:hiddenLine>
-            </a:ext>
-            <a:ext uri="{AF507438-7753-43E0-B8FC-AC1667EBCBE1}">
-              <a14:hiddenEffects xmlns:a14="http://schemas.microsoft.com/office/drawing/2010/main">
-                <a:effectLst>
-                  <a:outerShdw dist="35921" dir="2700000" algn="ctr" rotWithShape="0">
-                    <a:schemeClr val="bg2"/>
-                  </a:outerShdw>
-                </a:effectLst>
-              </a14:hiddenEffects>
-            </a:ext>
-          </a:extLst>
-        </p:spPr>
-      </p:pic>
-    </p:spTree>
-  </p:cSld>
-  <p:clrMapOvr>
-    <a:masterClrMapping/>
-  </p:clrMapOvr>
-</p:sld>
-</file>
-
-<file path=ppt/slides/slide9.xml><?xml version="1.0" encoding="utf-8"?>
-<p:sld xmlns:a="http://schemas.openxmlformats.org/drawingml/2006/main" xmlns:r="http://schemas.openxmlformats.org/officeDocument/2006/relationships" xmlns:p="http://schemas.openxmlformats.org/presentationml/2006/main">
-  <p:cSld>
-    <p:spTree>
-      <p:nvGrpSpPr>
-        <p:cNvPr id="1" name=""/>
-        <p:cNvGrpSpPr/>
-        <p:nvPr/>
-      </p:nvGrpSpPr>
-      <p:grpSpPr>
-        <a:xfrm>
-          <a:off x="0" y="0"/>
-          <a:ext cx="0" cy="0"/>
-          <a:chOff x="0" y="0"/>
-          <a:chExt cx="0" cy="0"/>
-        </a:xfrm>
-      </p:grpSpPr>
-      <p:pic>
-        <p:nvPicPr>
-          <p:cNvPr id="7170" name="Picture 2"/>
-          <p:cNvPicPr>
-            <a:picLocks noChangeAspect="1" noChangeArrowheads="1"/>
-          </p:cNvPicPr>
-          <p:nvPr/>
-        </p:nvPicPr>
-        <p:blipFill>
-          <a:blip r:embed="rId2">
-            <a:extLst>
-              <a:ext uri="{28A0092B-C50C-407E-A947-70E740481C1C}">
-                <a14:useLocalDpi xmlns:a14="http://schemas.microsoft.com/office/drawing/2010/main" val="0"/>
-              </a:ext>
-            </a:extLst>
-          </a:blip>
-          <a:srcRect/>
-          <a:stretch>
-            <a:fillRect/>
-          </a:stretch>
-        </p:blipFill>
-        <p:spPr bwMode="auto">
-          <a:xfrm>
-            <a:off x="791282" y="363474"/>
-            <a:ext cx="7055444" cy="5719826"/>
-          </a:xfrm>
-          <a:prstGeom prst="rect">
-            <a:avLst/>
-          </a:prstGeom>
-          <a:noFill/>
-          <a:ln>
-            <a:noFill/>
-          </a:ln>
-          <a:effectLst/>
-          <a:extLst>
-            <a:ext uri="{909E8E84-426E-40DD-AFC4-6F175D3DCCD1}">
-              <a14:hiddenFill xmlns:a14="http://schemas.microsoft.com/office/drawing/2010/main">
-                <a:solidFill>
-                  <a:schemeClr val="accent1"/>
-                </a:solidFill>
-              </a14:hiddenFill>
-            </a:ext>
-            <a:ext uri="{91240B29-F687-4F45-9708-019B960494DF}">
-              <a14:hiddenLine xmlns:a14="http://schemas.microsoft.com/office/drawing/2010/main" w="9525">
-                <a:solidFill>
-                  <a:schemeClr val="tx1"/>
-                </a:solidFill>
-                <a:miter lim="800000"/>
-                <a:headEnd/>
-                <a:tailEnd/>
-              </a14:hiddenLine>
-            </a:ext>
-            <a:ext uri="{AF507438-7753-43E0-B8FC-AC1667EBCBE1}">
-              <a14:hiddenEffects xmlns:a14="http://schemas.microsoft.com/office/drawing/2010/main">
-                <a:effectLst>
-                  <a:outerShdw dist="35921" dir="2700000" algn="ctr" rotWithShape="0">
-                    <a:schemeClr val="bg2"/>
-                  </a:outerShdw>
-                </a:effectLst>
-              </a14:hiddenEffects>
-            </a:ext>
-          </a:extLst>
-        </p:spPr>
-      </p:pic>
-      <p:sp>
-        <p:nvSpPr>
-          <p:cNvPr id="6" name="TextBox 5"/>
-          <p:cNvSpPr txBox="1"/>
-          <p:nvPr/>
-        </p:nvSpPr>
-        <p:spPr>
-          <a:xfrm rot="16200000">
-            <a:off x="-401330" y="2839730"/>
-            <a:ext cx="2087879" cy="523220"/>
-          </a:xfrm>
-          <a:prstGeom prst="rect">
-            <a:avLst/>
-          </a:prstGeom>
-          <a:noFill/>
-        </p:spPr>
-        <p:txBody>
-          <a:bodyPr wrap="none" rtlCol="0">
-            <a:spAutoFit/>
-          </a:bodyPr>
-          <a:lstStyle/>
-          <a:p>
-            <a:r>
-              <a:rPr lang="en-US" sz="2800" dirty="0"/>
-              <a:t>Pressure (Pa)</a:t>
-            </a:r>
-          </a:p>
-        </p:txBody>
-      </p:sp>
-      <p:sp>
-        <p:nvSpPr>
-          <p:cNvPr id="7" name="TextBox 6"/>
-          <p:cNvSpPr txBox="1"/>
-          <p:nvPr/>
-        </p:nvSpPr>
-        <p:spPr>
-          <a:xfrm>
-            <a:off x="3657600" y="6334780"/>
-            <a:ext cx="2067554" cy="523220"/>
-          </a:xfrm>
-          <a:prstGeom prst="rect">
-            <a:avLst/>
-          </a:prstGeom>
-          <a:noFill/>
-        </p:spPr>
-        <p:txBody>
-          <a:bodyPr wrap="none" rtlCol="0">
-            <a:spAutoFit/>
-          </a:bodyPr>
-          <a:lstStyle/>
-          <a:p>
-            <a:r>
-              <a:rPr lang="en-US" sz="2800" dirty="0"/>
-              <a:t>Volume (m</a:t>
-            </a:r>
-            <a:r>
-              <a:rPr lang="en-US" sz="2800" baseline="30000" dirty="0"/>
-              <a:t>3</a:t>
-            </a:r>
-            <a:r>
-              <a:rPr lang="en-US" sz="2800" dirty="0"/>
-              <a:t>)</a:t>
-            </a:r>
-          </a:p>
-        </p:txBody>
-      </p:sp>
-      <p:sp>
-        <p:nvSpPr>
-          <p:cNvPr id="8" name="Oval 7"/>
-          <p:cNvSpPr/>
-          <p:nvPr/>
-        </p:nvSpPr>
-        <p:spPr>
-          <a:xfrm>
-            <a:off x="2251020" y="914400"/>
-            <a:ext cx="152400" cy="152400"/>
-          </a:xfrm>
-          <a:prstGeom prst="ellipse">
-            <a:avLst/>
-          </a:prstGeom>
-          <a:solidFill>
-            <a:srgbClr val="FF0000"/>
-          </a:solidFill>
-          <a:ln>
-            <a:noFill/>
-          </a:ln>
-        </p:spPr>
-        <p:style>
-          <a:lnRef idx="2">
-            <a:schemeClr val="accent1">
-              <a:shade val="50000"/>
-            </a:schemeClr>
-          </a:lnRef>
-          <a:fillRef idx="1">
-            <a:schemeClr val="accent1"/>
-          </a:fillRef>
-          <a:effectRef idx="0">
-            <a:schemeClr val="accent1"/>
-          </a:effectRef>
-          <a:fontRef idx="minor">
-            <a:schemeClr val="lt1"/>
-          </a:fontRef>
-        </p:style>
-        <p:txBody>
-          <a:bodyPr rtlCol="0" anchor="ctr"/>
-          <a:lstStyle/>
-          <a:p>
-            <a:pPr algn="ctr"/>
-            <a:endParaRPr lang="en-US"/>
-          </a:p>
-        </p:txBody>
-      </p:sp>
-      <p:sp>
-        <p:nvSpPr>
-          <p:cNvPr id="9" name="Oval 8"/>
-          <p:cNvSpPr/>
-          <p:nvPr/>
-        </p:nvSpPr>
-        <p:spPr>
-          <a:xfrm>
-            <a:off x="2251020" y="2490850"/>
-            <a:ext cx="152400" cy="152400"/>
-          </a:xfrm>
-          <a:prstGeom prst="ellipse">
-            <a:avLst/>
-          </a:prstGeom>
-          <a:solidFill>
-            <a:srgbClr val="FF0000"/>
-          </a:solidFill>
-          <a:ln>
-            <a:noFill/>
-          </a:ln>
-        </p:spPr>
-        <p:style>
-          <a:lnRef idx="2">
-            <a:schemeClr val="accent1">
-              <a:shade val="50000"/>
-            </a:schemeClr>
-          </a:lnRef>
-          <a:fillRef idx="1">
-            <a:schemeClr val="accent1"/>
-          </a:fillRef>
-          <a:effectRef idx="0">
-            <a:schemeClr val="accent1"/>
-          </a:effectRef>
-          <a:fontRef idx="minor">
-            <a:schemeClr val="lt1"/>
-          </a:fontRef>
-        </p:style>
-        <p:txBody>
-          <a:bodyPr rtlCol="0" anchor="ctr"/>
-          <a:lstStyle/>
-          <a:p>
-            <a:pPr algn="ctr"/>
-            <a:endParaRPr lang="en-US"/>
-          </a:p>
-        </p:txBody>
-      </p:sp>
-      <p:sp>
-        <p:nvSpPr>
-          <p:cNvPr id="10" name="Oval 9"/>
-          <p:cNvSpPr/>
-          <p:nvPr/>
-        </p:nvSpPr>
-        <p:spPr>
-          <a:xfrm>
-            <a:off x="2251020" y="5356469"/>
-            <a:ext cx="152400" cy="152400"/>
-          </a:xfrm>
-          <a:prstGeom prst="ellipse">
-            <a:avLst/>
-          </a:prstGeom>
-          <a:solidFill>
-            <a:srgbClr val="FF0000"/>
-          </a:solidFill>
-          <a:ln>
-            <a:noFill/>
-          </a:ln>
-        </p:spPr>
-        <p:style>
-          <a:lnRef idx="2">
-            <a:schemeClr val="accent1">
-              <a:shade val="50000"/>
-            </a:schemeClr>
-          </a:lnRef>
-          <a:fillRef idx="1">
-            <a:schemeClr val="accent1"/>
-          </a:fillRef>
-          <a:effectRef idx="0">
-            <a:schemeClr val="accent1"/>
-          </a:effectRef>
-          <a:fontRef idx="minor">
-            <a:schemeClr val="lt1"/>
-          </a:fontRef>
-        </p:style>
-        <p:txBody>
-          <a:bodyPr rtlCol="0" anchor="ctr"/>
-          <a:lstStyle/>
-          <a:p>
-            <a:pPr algn="ctr"/>
-            <a:endParaRPr lang="en-US"/>
-          </a:p>
-        </p:txBody>
-      </p:sp>
-      <p:sp>
-        <p:nvSpPr>
-          <p:cNvPr id="11" name="Oval 10"/>
-          <p:cNvSpPr/>
-          <p:nvPr/>
-        </p:nvSpPr>
-        <p:spPr>
-          <a:xfrm>
-            <a:off x="7353919" y="5254036"/>
-            <a:ext cx="152400" cy="152400"/>
-          </a:xfrm>
-          <a:prstGeom prst="ellipse">
-            <a:avLst/>
-          </a:prstGeom>
-          <a:solidFill>
-            <a:srgbClr val="FF0000"/>
-          </a:solidFill>
-          <a:ln>
-            <a:noFill/>
-          </a:ln>
-        </p:spPr>
-        <p:style>
-          <a:lnRef idx="2">
-            <a:schemeClr val="accent1">
-              <a:shade val="50000"/>
-            </a:schemeClr>
-          </a:lnRef>
-          <a:fillRef idx="1">
-            <a:schemeClr val="accent1"/>
-          </a:fillRef>
-          <a:effectRef idx="0">
-            <a:schemeClr val="accent1"/>
-          </a:effectRef>
-          <a:fontRef idx="minor">
-            <a:schemeClr val="lt1"/>
-          </a:fontRef>
-        </p:style>
-        <p:txBody>
-          <a:bodyPr rtlCol="0" anchor="ctr"/>
-          <a:lstStyle/>
-          <a:p>
-            <a:pPr algn="ctr"/>
-            <a:endParaRPr lang="en-US"/>
-          </a:p>
-        </p:txBody>
-      </p:sp>
-      <p:sp>
-        <p:nvSpPr>
-          <p:cNvPr id="12" name="Oval 11"/>
-          <p:cNvSpPr/>
-          <p:nvPr/>
-        </p:nvSpPr>
-        <p:spPr>
-          <a:xfrm>
-            <a:off x="7353919" y="5361466"/>
-            <a:ext cx="152400" cy="152400"/>
-          </a:xfrm>
-          <a:prstGeom prst="ellipse">
-            <a:avLst/>
-          </a:prstGeom>
-          <a:solidFill>
-            <a:srgbClr val="FF0000"/>
-          </a:solidFill>
-          <a:ln>
-            <a:noFill/>
-          </a:ln>
-        </p:spPr>
-        <p:style>
-          <a:lnRef idx="2">
-            <a:schemeClr val="accent1">
-              <a:shade val="50000"/>
-            </a:schemeClr>
-          </a:lnRef>
-          <a:fillRef idx="1">
-            <a:schemeClr val="accent1"/>
-          </a:fillRef>
-          <a:effectRef idx="0">
-            <a:schemeClr val="accent1"/>
-          </a:effectRef>
-          <a:fontRef idx="minor">
-            <a:schemeClr val="lt1"/>
-          </a:fontRef>
-        </p:style>
-        <p:txBody>
-          <a:bodyPr rtlCol="0" anchor="ctr"/>
-          <a:lstStyle/>
-          <a:p>
-            <a:pPr algn="ctr"/>
-            <a:endParaRPr lang="en-US"/>
-          </a:p>
-        </p:txBody>
-      </p:sp>
-      <p:sp>
-        <p:nvSpPr>
-          <p:cNvPr id="14" name="TextBox 13"/>
-          <p:cNvSpPr txBox="1"/>
-          <p:nvPr/>
-        </p:nvSpPr>
-        <p:spPr>
-          <a:xfrm>
-            <a:off x="7944786" y="5741233"/>
-            <a:ext cx="421910" cy="584775"/>
-          </a:xfrm>
-          <a:prstGeom prst="rect">
-            <a:avLst/>
-          </a:prstGeom>
-          <a:noFill/>
-        </p:spPr>
-        <p:txBody>
-          <a:bodyPr wrap="none" rtlCol="0">
-            <a:spAutoFit/>
-          </a:bodyPr>
-          <a:lstStyle/>
-          <a:p>
-            <a:r>
-              <a:rPr lang="en-US" sz="3200" dirty="0">
-                <a:solidFill>
-                  <a:srgbClr val="FF0000"/>
-                </a:solidFill>
-              </a:rPr>
-              <a:t>A</a:t>
-            </a:r>
-          </a:p>
-        </p:txBody>
-      </p:sp>
-      <p:cxnSp>
-        <p:nvCxnSpPr>
-          <p:cNvPr id="16" name="Straight Arrow Connector 15"/>
-          <p:cNvCxnSpPr/>
-          <p:nvPr/>
-        </p:nvCxnSpPr>
-        <p:spPr>
-          <a:xfrm flipH="1" flipV="1">
-            <a:off x="7495081" y="5546362"/>
-            <a:ext cx="389745" cy="374753"/>
-          </a:xfrm>
-          <a:prstGeom prst="straightConnector1">
-            <a:avLst/>
-          </a:prstGeom>
-          <a:ln>
-            <a:tailEnd type="arrow"/>
-          </a:ln>
-        </p:spPr>
-        <p:style>
-          <a:lnRef idx="1">
-            <a:schemeClr val="accent1"/>
-          </a:lnRef>
-          <a:fillRef idx="0">
-            <a:schemeClr val="accent1"/>
-          </a:fillRef>
-          <a:effectRef idx="0">
-            <a:schemeClr val="accent1"/>
-          </a:effectRef>
-          <a:fontRef idx="minor">
-            <a:schemeClr val="tx1"/>
-          </a:fontRef>
-        </p:style>
-      </p:cxnSp>
-      <p:sp>
-        <p:nvSpPr>
-          <p:cNvPr id="17" name="TextBox 16"/>
-          <p:cNvSpPr txBox="1"/>
-          <p:nvPr/>
-        </p:nvSpPr>
-        <p:spPr>
-          <a:xfrm>
-            <a:off x="7557540" y="4424598"/>
-            <a:ext cx="437940" cy="584775"/>
-          </a:xfrm>
-          <a:prstGeom prst="rect">
-            <a:avLst/>
-          </a:prstGeom>
-          <a:noFill/>
-        </p:spPr>
-        <p:txBody>
-          <a:bodyPr wrap="none" rtlCol="0">
-            <a:spAutoFit/>
-          </a:bodyPr>
-          <a:lstStyle/>
-          <a:p>
-            <a:r>
-              <a:rPr lang="en-US" sz="3200" dirty="0">
-                <a:solidFill>
-                  <a:srgbClr val="FF0000"/>
-                </a:solidFill>
-              </a:rPr>
-              <a:t>D</a:t>
-            </a:r>
-          </a:p>
-        </p:txBody>
-      </p:sp>
-      <p:cxnSp>
-        <p:nvCxnSpPr>
-          <p:cNvPr id="18" name="Straight Arrow Connector 17"/>
-          <p:cNvCxnSpPr/>
-          <p:nvPr/>
-        </p:nvCxnSpPr>
-        <p:spPr>
-          <a:xfrm flipH="1">
-            <a:off x="7510072" y="4946754"/>
-            <a:ext cx="104931" cy="269823"/>
-          </a:xfrm>
-          <a:prstGeom prst="straightConnector1">
-            <a:avLst/>
-          </a:prstGeom>
-          <a:ln>
-            <a:tailEnd type="arrow"/>
-          </a:ln>
-        </p:spPr>
-        <p:style>
-          <a:lnRef idx="1">
-            <a:schemeClr val="accent1"/>
-          </a:lnRef>
-          <a:fillRef idx="0">
-            <a:schemeClr val="accent1"/>
-          </a:fillRef>
-          <a:effectRef idx="0">
-            <a:schemeClr val="accent1"/>
-          </a:effectRef>
-          <a:fontRef idx="minor">
-            <a:schemeClr val="tx1"/>
-          </a:fontRef>
-        </p:style>
-      </p:cxnSp>
-      <p:sp>
-        <p:nvSpPr>
-          <p:cNvPr id="21" name="TextBox 20"/>
-          <p:cNvSpPr txBox="1"/>
-          <p:nvPr/>
-        </p:nvSpPr>
-        <p:spPr>
-          <a:xfrm>
-            <a:off x="1936228" y="2131104"/>
-            <a:ext cx="421910" cy="584775"/>
-          </a:xfrm>
-          <a:prstGeom prst="rect">
-            <a:avLst/>
-          </a:prstGeom>
-          <a:noFill/>
-        </p:spPr>
-        <p:txBody>
-          <a:bodyPr wrap="none" rtlCol="0">
-            <a:spAutoFit/>
-          </a:bodyPr>
-          <a:lstStyle/>
-          <a:p>
-            <a:r>
-              <a:rPr lang="en-US" sz="3200" dirty="0">
-                <a:solidFill>
-                  <a:srgbClr val="FF0000"/>
-                </a:solidFill>
-              </a:rPr>
-              <a:t>B</a:t>
-            </a:r>
-          </a:p>
-        </p:txBody>
-      </p:sp>
-      <p:sp>
-        <p:nvSpPr>
-          <p:cNvPr id="22" name="TextBox 21"/>
-          <p:cNvSpPr txBox="1"/>
-          <p:nvPr/>
-        </p:nvSpPr>
-        <p:spPr>
-          <a:xfrm>
-            <a:off x="2448393" y="784485"/>
-            <a:ext cx="404278" cy="584775"/>
-          </a:xfrm>
-          <a:prstGeom prst="rect">
-            <a:avLst/>
-          </a:prstGeom>
-          <a:noFill/>
-        </p:spPr>
-        <p:txBody>
-          <a:bodyPr wrap="none" rtlCol="0">
-            <a:spAutoFit/>
-          </a:bodyPr>
-          <a:lstStyle/>
-          <a:p>
-            <a:r>
-              <a:rPr lang="en-US" sz="3200" dirty="0">
-                <a:solidFill>
-                  <a:srgbClr val="FF0000"/>
-                </a:solidFill>
-              </a:rPr>
-              <a:t>C</a:t>
-            </a:r>
-          </a:p>
-        </p:txBody>
-      </p:sp>
-      <p:sp>
-        <p:nvSpPr>
-          <p:cNvPr id="23" name="TextBox 22"/>
-          <p:cNvSpPr txBox="1"/>
-          <p:nvPr/>
-        </p:nvSpPr>
-        <p:spPr>
-          <a:xfrm>
-            <a:off x="1941226" y="4954249"/>
-            <a:ext cx="320922" cy="584775"/>
-          </a:xfrm>
-          <a:prstGeom prst="rect">
-            <a:avLst/>
-          </a:prstGeom>
-          <a:noFill/>
-        </p:spPr>
-        <p:txBody>
-          <a:bodyPr wrap="none" rtlCol="0">
-            <a:spAutoFit/>
-          </a:bodyPr>
-          <a:lstStyle/>
-          <a:p>
-            <a:r>
-              <a:rPr lang="en-US" sz="3200" dirty="0">
-                <a:solidFill>
-                  <a:srgbClr val="FF0000"/>
-                </a:solidFill>
-                <a:latin typeface="Times" pitchFamily="18" charset="0"/>
-                <a:cs typeface="Times" pitchFamily="18" charset="0"/>
-              </a:rPr>
-              <a:t>I</a:t>
-            </a:r>
-          </a:p>
-        </p:txBody>
-      </p:sp>
-      <p:sp>
-        <p:nvSpPr>
-          <p:cNvPr id="19" name="Right Arrow 18"/>
-          <p:cNvSpPr/>
-          <p:nvPr/>
-        </p:nvSpPr>
-        <p:spPr>
-          <a:xfrm>
-            <a:off x="1124264" y="1499018"/>
-            <a:ext cx="1244184" cy="764499"/>
-          </a:xfrm>
-          <a:prstGeom prst="rightArrow">
-            <a:avLst>
-              <a:gd name="adj1" fmla="val 50000"/>
-              <a:gd name="adj2" fmla="val 55714"/>
-            </a:avLst>
-          </a:prstGeom>
-          <a:gradFill flip="none" rotWithShape="1">
-            <a:gsLst>
-              <a:gs pos="0">
-                <a:srgbClr val="FFC000">
-                  <a:tint val="66000"/>
-                  <a:satMod val="160000"/>
-                  <a:alpha val="53000"/>
-                </a:srgbClr>
-              </a:gs>
-              <a:gs pos="50000">
-                <a:srgbClr val="FFC000">
-                  <a:tint val="44500"/>
-                  <a:satMod val="160000"/>
-                </a:srgbClr>
-              </a:gs>
-              <a:gs pos="100000">
-                <a:srgbClr val="FFC000">
-                  <a:tint val="23500"/>
-                  <a:satMod val="160000"/>
-                </a:srgbClr>
-              </a:gs>
-            </a:gsLst>
-            <a:lin ang="10800000" scaled="1"/>
-            <a:tileRect/>
-          </a:gradFill>
-          <a:ln>
-            <a:noFill/>
-          </a:ln>
-        </p:spPr>
-        <p:style>
-          <a:lnRef idx="2">
-            <a:schemeClr val="accent1">
-              <a:shade val="50000"/>
-            </a:schemeClr>
-          </a:lnRef>
-          <a:fillRef idx="1">
-            <a:schemeClr val="accent1"/>
-          </a:fillRef>
-          <a:effectRef idx="0">
-            <a:schemeClr val="accent1"/>
-          </a:effectRef>
-          <a:fontRef idx="minor">
-            <a:schemeClr val="lt1"/>
-          </a:fontRef>
-        </p:style>
-        <p:txBody>
-          <a:bodyPr rtlCol="0" anchor="ctr"/>
-          <a:lstStyle/>
-          <a:p>
-            <a:pPr algn="ctr"/>
-            <a:endParaRPr lang="en-US"/>
-          </a:p>
-        </p:txBody>
-      </p:sp>
-      <p:sp>
-        <p:nvSpPr>
-          <p:cNvPr id="24" name="Right Arrow 23"/>
-          <p:cNvSpPr/>
-          <p:nvPr/>
-        </p:nvSpPr>
-        <p:spPr>
-          <a:xfrm>
-            <a:off x="7615002" y="5054183"/>
-            <a:ext cx="1064303" cy="764499"/>
-          </a:xfrm>
-          <a:prstGeom prst="rightArrow">
-            <a:avLst>
-              <a:gd name="adj1" fmla="val 50000"/>
-              <a:gd name="adj2" fmla="val 55714"/>
-            </a:avLst>
-          </a:prstGeom>
-          <a:gradFill flip="none" rotWithShape="1">
-            <a:gsLst>
-              <a:gs pos="0">
-                <a:srgbClr val="FFC000">
-                  <a:tint val="66000"/>
-                  <a:satMod val="160000"/>
-                </a:srgbClr>
-              </a:gs>
-              <a:gs pos="50000">
-                <a:srgbClr val="FFC000">
-                  <a:tint val="44500"/>
-                  <a:satMod val="160000"/>
-                </a:srgbClr>
-              </a:gs>
-              <a:gs pos="100000">
-                <a:srgbClr val="FFC000">
-                  <a:tint val="23500"/>
-                  <a:satMod val="160000"/>
-                </a:srgbClr>
-              </a:gs>
-            </a:gsLst>
-            <a:lin ang="10800000" scaled="1"/>
-            <a:tileRect/>
-          </a:gradFill>
-          <a:ln>
-            <a:noFill/>
-          </a:ln>
-        </p:spPr>
-        <p:style>
-          <a:lnRef idx="2">
-            <a:schemeClr val="accent1">
-              <a:shade val="50000"/>
-            </a:schemeClr>
-          </a:lnRef>
-          <a:fillRef idx="1">
-            <a:schemeClr val="accent1"/>
-          </a:fillRef>
-          <a:effectRef idx="0">
-            <a:schemeClr val="accent1"/>
-          </a:effectRef>
-          <a:fontRef idx="minor">
-            <a:schemeClr val="lt1"/>
-          </a:fontRef>
-        </p:style>
-        <p:txBody>
-          <a:bodyPr rtlCol="0" anchor="ctr"/>
-          <a:lstStyle/>
-          <a:p>
-            <a:pPr algn="ctr"/>
-            <a:endParaRPr lang="en-US"/>
-          </a:p>
-        </p:txBody>
-      </p:sp>
-      <p:sp>
-        <p:nvSpPr>
-          <p:cNvPr id="29" name="TextBox 28"/>
-          <p:cNvSpPr txBox="1"/>
-          <p:nvPr/>
-        </p:nvSpPr>
-        <p:spPr>
-          <a:xfrm>
-            <a:off x="1484025" y="1611445"/>
-            <a:ext cx="881103" cy="461665"/>
-          </a:xfrm>
-          <a:prstGeom prst="rect">
-            <a:avLst/>
-          </a:prstGeom>
-          <a:noFill/>
-        </p:spPr>
-        <p:txBody>
-          <a:bodyPr wrap="square" rtlCol="0">
-            <a:spAutoFit/>
-          </a:bodyPr>
-          <a:lstStyle/>
-          <a:p>
-            <a:r>
-              <a:rPr lang="en-US" sz="2400" dirty="0" err="1">
-                <a:solidFill>
-                  <a:schemeClr val="accent6">
-                    <a:lumMod val="75000"/>
-                  </a:schemeClr>
-                </a:solidFill>
-              </a:rPr>
-              <a:t>Q</a:t>
-            </a:r>
-            <a:r>
-              <a:rPr lang="en-US" sz="2400" baseline="-25000" dirty="0" err="1">
-                <a:solidFill>
-                  <a:schemeClr val="accent6">
-                    <a:lumMod val="75000"/>
-                  </a:schemeClr>
-                </a:solidFill>
-              </a:rPr>
-              <a:t>h</a:t>
-            </a:r>
-            <a:endParaRPr lang="en-US" sz="2400" baseline="-25000" dirty="0">
-              <a:solidFill>
-                <a:schemeClr val="accent6">
-                  <a:lumMod val="75000"/>
-                </a:schemeClr>
-              </a:solidFill>
-            </a:endParaRPr>
-          </a:p>
-        </p:txBody>
-      </p:sp>
-      <p:sp>
-        <p:nvSpPr>
-          <p:cNvPr id="30" name="TextBox 29"/>
-          <p:cNvSpPr txBox="1"/>
-          <p:nvPr/>
-        </p:nvSpPr>
-        <p:spPr>
-          <a:xfrm>
-            <a:off x="7744914" y="5211581"/>
-            <a:ext cx="478016" cy="461665"/>
-          </a:xfrm>
-          <a:prstGeom prst="rect">
-            <a:avLst/>
-          </a:prstGeom>
-          <a:noFill/>
-        </p:spPr>
-        <p:txBody>
-          <a:bodyPr wrap="none" rtlCol="0">
-            <a:spAutoFit/>
-          </a:bodyPr>
-          <a:lstStyle/>
-          <a:p>
-            <a:r>
-              <a:rPr lang="en-US" sz="2400" dirty="0">
-                <a:solidFill>
-                  <a:schemeClr val="accent6">
-                    <a:lumMod val="75000"/>
-                  </a:schemeClr>
-                </a:solidFill>
-              </a:rPr>
-              <a:t>Q</a:t>
-            </a:r>
-            <a:r>
-              <a:rPr lang="en-US" sz="2400" baseline="-25000" dirty="0">
-                <a:solidFill>
-                  <a:schemeClr val="accent6">
-                    <a:lumMod val="75000"/>
-                  </a:schemeClr>
-                </a:solidFill>
-              </a:rPr>
-              <a:t>c</a:t>
-            </a:r>
-          </a:p>
-        </p:txBody>
-      </p:sp>
-      <p:sp>
-        <p:nvSpPr>
-          <p:cNvPr id="31" name="Right Arrow 30"/>
-          <p:cNvSpPr/>
-          <p:nvPr/>
-        </p:nvSpPr>
-        <p:spPr>
-          <a:xfrm>
-            <a:off x="3869957" y="4023607"/>
-            <a:ext cx="2440900" cy="764499"/>
-          </a:xfrm>
-          <a:prstGeom prst="rightArrow">
-            <a:avLst>
-              <a:gd name="adj1" fmla="val 50000"/>
-              <a:gd name="adj2" fmla="val 55714"/>
-            </a:avLst>
-          </a:prstGeom>
-          <a:gradFill flip="none" rotWithShape="1">
-            <a:gsLst>
-              <a:gs pos="0">
-                <a:schemeClr val="accent3">
-                  <a:lumMod val="75000"/>
-                  <a:tint val="66000"/>
-                  <a:satMod val="160000"/>
-                </a:schemeClr>
-              </a:gs>
-              <a:gs pos="50000">
-                <a:schemeClr val="accent3">
-                  <a:lumMod val="75000"/>
-                  <a:tint val="44500"/>
-                  <a:satMod val="160000"/>
-                </a:schemeClr>
-              </a:gs>
-              <a:gs pos="100000">
-                <a:schemeClr val="accent3">
-                  <a:lumMod val="75000"/>
-                  <a:tint val="23500"/>
-                  <a:satMod val="160000"/>
-                </a:schemeClr>
-              </a:gs>
-            </a:gsLst>
-            <a:lin ang="10800000" scaled="1"/>
-            <a:tileRect/>
-          </a:gradFill>
-          <a:ln>
-            <a:noFill/>
-          </a:ln>
-        </p:spPr>
-        <p:style>
-          <a:lnRef idx="2">
-            <a:schemeClr val="accent1">
-              <a:shade val="50000"/>
-            </a:schemeClr>
-          </a:lnRef>
-          <a:fillRef idx="1">
-            <a:schemeClr val="accent1"/>
-          </a:fillRef>
-          <a:effectRef idx="0">
-            <a:schemeClr val="accent1"/>
-          </a:effectRef>
-          <a:fontRef idx="minor">
-            <a:schemeClr val="lt1"/>
-          </a:fontRef>
-        </p:style>
-        <p:txBody>
-          <a:bodyPr rtlCol="0" anchor="ctr"/>
-          <a:lstStyle/>
-          <a:p>
-            <a:pPr algn="ctr"/>
-            <a:endParaRPr lang="en-US"/>
-          </a:p>
-        </p:txBody>
-      </p:sp>
-      <p:sp>
-        <p:nvSpPr>
-          <p:cNvPr id="32" name="Right Arrow 31"/>
-          <p:cNvSpPr/>
-          <p:nvPr/>
-        </p:nvSpPr>
-        <p:spPr>
-          <a:xfrm>
-            <a:off x="704537" y="4023607"/>
-            <a:ext cx="2208550" cy="764499"/>
-          </a:xfrm>
-          <a:prstGeom prst="rightArrow">
-            <a:avLst>
-              <a:gd name="adj1" fmla="val 50000"/>
-              <a:gd name="adj2" fmla="val 55714"/>
-            </a:avLst>
-          </a:prstGeom>
-          <a:gradFill flip="none" rotWithShape="1">
-            <a:gsLst>
-              <a:gs pos="0">
-                <a:schemeClr val="accent3">
-                  <a:lumMod val="75000"/>
-                  <a:tint val="66000"/>
-                  <a:satMod val="160000"/>
-                </a:schemeClr>
-              </a:gs>
-              <a:gs pos="50000">
-                <a:schemeClr val="accent3">
-                  <a:lumMod val="75000"/>
-                  <a:tint val="44500"/>
-                  <a:satMod val="160000"/>
-                </a:schemeClr>
-              </a:gs>
-              <a:gs pos="100000">
-                <a:schemeClr val="accent3">
-                  <a:lumMod val="75000"/>
-                  <a:tint val="23500"/>
-                  <a:satMod val="160000"/>
-                </a:schemeClr>
-              </a:gs>
-            </a:gsLst>
-            <a:lin ang="10800000" scaled="1"/>
-            <a:tileRect/>
-          </a:gradFill>
-          <a:ln>
-            <a:noFill/>
-          </a:ln>
-        </p:spPr>
-        <p:style>
-          <a:lnRef idx="2">
-            <a:schemeClr val="accent1">
-              <a:shade val="50000"/>
-            </a:schemeClr>
-          </a:lnRef>
-          <a:fillRef idx="1">
-            <a:schemeClr val="accent1"/>
-          </a:fillRef>
-          <a:effectRef idx="0">
-            <a:schemeClr val="accent1"/>
-          </a:effectRef>
-          <a:fontRef idx="minor">
-            <a:schemeClr val="lt1"/>
-          </a:fontRef>
-        </p:style>
-        <p:txBody>
-          <a:bodyPr rtlCol="0" anchor="ctr"/>
-          <a:lstStyle/>
-          <a:p>
-            <a:pPr algn="ctr"/>
-            <a:endParaRPr lang="en-US"/>
-          </a:p>
-        </p:txBody>
-      </p:sp>
-      <p:sp>
-        <p:nvSpPr>
-          <p:cNvPr id="33" name="TextBox 32"/>
-          <p:cNvSpPr txBox="1"/>
-          <p:nvPr/>
-        </p:nvSpPr>
-        <p:spPr>
-          <a:xfrm>
-            <a:off x="642073" y="4175024"/>
-            <a:ext cx="2052228" cy="461665"/>
-          </a:xfrm>
-          <a:prstGeom prst="rect">
-            <a:avLst/>
-          </a:prstGeom>
-          <a:noFill/>
-        </p:spPr>
-        <p:txBody>
-          <a:bodyPr wrap="none" rtlCol="0">
-            <a:spAutoFit/>
-          </a:bodyPr>
-          <a:lstStyle/>
-          <a:p>
-            <a:r>
-              <a:rPr lang="en-US" sz="2400" dirty="0">
-                <a:solidFill>
-                  <a:schemeClr val="accent3">
-                    <a:lumMod val="50000"/>
-                  </a:schemeClr>
-                </a:solidFill>
-              </a:rPr>
-              <a:t>Work Required</a:t>
-            </a:r>
-            <a:endParaRPr lang="en-US" sz="2400" baseline="-25000" dirty="0">
-              <a:solidFill>
-                <a:schemeClr val="accent3">
-                  <a:lumMod val="50000"/>
-                </a:schemeClr>
-              </a:solidFill>
-            </a:endParaRPr>
-          </a:p>
-        </p:txBody>
-      </p:sp>
-      <p:sp>
-        <p:nvSpPr>
-          <p:cNvPr id="34" name="TextBox 33"/>
-          <p:cNvSpPr txBox="1"/>
-          <p:nvPr/>
-        </p:nvSpPr>
-        <p:spPr>
-          <a:xfrm>
-            <a:off x="3852468" y="4175024"/>
-            <a:ext cx="2256130" cy="461665"/>
-          </a:xfrm>
-          <a:prstGeom prst="rect">
-            <a:avLst/>
-          </a:prstGeom>
-          <a:noFill/>
-        </p:spPr>
-        <p:txBody>
-          <a:bodyPr wrap="none" rtlCol="0">
-            <a:spAutoFit/>
-          </a:bodyPr>
-          <a:lstStyle/>
-          <a:p>
-            <a:r>
-              <a:rPr lang="en-US" sz="2400" dirty="0">
-                <a:solidFill>
-                  <a:schemeClr val="accent3">
-                    <a:lumMod val="50000"/>
-                  </a:schemeClr>
-                </a:solidFill>
-              </a:rPr>
-              <a:t>Useful Work Out</a:t>
-            </a:r>
-            <a:endParaRPr lang="en-US" sz="2400" baseline="-25000" dirty="0">
-              <a:solidFill>
-                <a:schemeClr val="accent3">
-                  <a:lumMod val="50000"/>
-                </a:schemeClr>
-              </a:solidFill>
-            </a:endParaRPr>
           </a:p>
         </p:txBody>
       </p:sp>

</xml_diff>